<commit_message>
Translation slides fixes and new code examples
</commit_message>
<xml_diff>
--- a/lectures3/Pythonlearn-01-Intro.pptx
+++ b/lectures3/Pythonlearn-01-Intro.pptx
@@ -1068,7 +1068,7 @@
               </a:spcBef>
               <a:buNone/>
             </a:pPr>
-            <a:endParaRPr/>
+            <a:endParaRPr dirty="0"/>
           </a:p>
         </p:txBody>
       </p:sp>
@@ -1174,7 +1174,7 @@
               </a:spcBef>
               <a:buNone/>
             </a:pPr>
-            <a:endParaRPr/>
+            <a:endParaRPr dirty="0"/>
           </a:p>
         </p:txBody>
       </p:sp>
@@ -1280,7 +1280,7 @@
               </a:spcBef>
               <a:buNone/>
             </a:pPr>
-            <a:endParaRPr/>
+            <a:endParaRPr dirty="0"/>
           </a:p>
         </p:txBody>
       </p:sp>
@@ -1386,7 +1386,7 @@
               </a:spcBef>
               <a:buNone/>
             </a:pPr>
-            <a:endParaRPr/>
+            <a:endParaRPr dirty="0"/>
           </a:p>
         </p:txBody>
       </p:sp>
@@ -1492,7 +1492,7 @@
               </a:spcBef>
               <a:buNone/>
             </a:pPr>
-            <a:endParaRPr/>
+            <a:endParaRPr dirty="0"/>
           </a:p>
         </p:txBody>
       </p:sp>
@@ -1598,7 +1598,7 @@
               </a:spcBef>
               <a:buNone/>
             </a:pPr>
-            <a:endParaRPr/>
+            <a:endParaRPr dirty="0"/>
           </a:p>
         </p:txBody>
       </p:sp>
@@ -1704,7 +1704,7 @@
               </a:spcBef>
               <a:buNone/>
             </a:pPr>
-            <a:endParaRPr/>
+            <a:endParaRPr dirty="0"/>
           </a:p>
         </p:txBody>
       </p:sp>
@@ -1810,7 +1810,7 @@
               </a:spcBef>
               <a:buNone/>
             </a:pPr>
-            <a:endParaRPr/>
+            <a:endParaRPr dirty="0"/>
           </a:p>
         </p:txBody>
       </p:sp>
@@ -1916,7 +1916,7 @@
               </a:spcBef>
               <a:buNone/>
             </a:pPr>
-            <a:endParaRPr/>
+            <a:endParaRPr dirty="0"/>
           </a:p>
         </p:txBody>
       </p:sp>
@@ -2022,7 +2022,7 @@
               </a:spcBef>
               <a:buNone/>
             </a:pPr>
-            <a:endParaRPr/>
+            <a:endParaRPr dirty="0"/>
           </a:p>
         </p:txBody>
       </p:sp>
@@ -2128,7 +2128,7 @@
               </a:spcBef>
               <a:buNone/>
             </a:pPr>
-            <a:endParaRPr/>
+            <a:endParaRPr dirty="0"/>
           </a:p>
         </p:txBody>
       </p:sp>
@@ -2234,7 +2234,7 @@
               </a:spcBef>
               <a:buNone/>
             </a:pPr>
-            <a:endParaRPr/>
+            <a:endParaRPr dirty="0"/>
           </a:p>
         </p:txBody>
       </p:sp>
@@ -2340,7 +2340,7 @@
               </a:spcBef>
               <a:buNone/>
             </a:pPr>
-            <a:endParaRPr/>
+            <a:endParaRPr dirty="0"/>
           </a:p>
         </p:txBody>
       </p:sp>
@@ -2446,7 +2446,7 @@
               </a:spcBef>
               <a:buNone/>
             </a:pPr>
-            <a:endParaRPr/>
+            <a:endParaRPr dirty="0"/>
           </a:p>
         </p:txBody>
       </p:sp>
@@ -2552,7 +2552,7 @@
               </a:spcBef>
               <a:buNone/>
             </a:pPr>
-            <a:endParaRPr/>
+            <a:endParaRPr dirty="0"/>
           </a:p>
         </p:txBody>
       </p:sp>
@@ -2658,7 +2658,7 @@
               </a:spcBef>
               <a:buNone/>
             </a:pPr>
-            <a:endParaRPr/>
+            <a:endParaRPr dirty="0"/>
           </a:p>
         </p:txBody>
       </p:sp>
@@ -2764,7 +2764,7 @@
               </a:spcBef>
               <a:buNone/>
             </a:pPr>
-            <a:endParaRPr/>
+            <a:endParaRPr dirty="0"/>
           </a:p>
         </p:txBody>
       </p:sp>
@@ -2870,7 +2870,7 @@
               </a:spcBef>
               <a:buNone/>
             </a:pPr>
-            <a:endParaRPr/>
+            <a:endParaRPr dirty="0"/>
           </a:p>
         </p:txBody>
       </p:sp>
@@ -2976,7 +2976,7 @@
               </a:spcBef>
               <a:buNone/>
             </a:pPr>
-            <a:endParaRPr/>
+            <a:endParaRPr dirty="0"/>
           </a:p>
         </p:txBody>
       </p:sp>
@@ -3082,7 +3082,7 @@
               </a:spcBef>
               <a:buNone/>
             </a:pPr>
-            <a:endParaRPr/>
+            <a:endParaRPr dirty="0"/>
           </a:p>
         </p:txBody>
       </p:sp>
@@ -3188,7 +3188,7 @@
               </a:spcBef>
               <a:buNone/>
             </a:pPr>
-            <a:endParaRPr/>
+            <a:endParaRPr dirty="0"/>
           </a:p>
         </p:txBody>
       </p:sp>
@@ -3294,7 +3294,7 @@
               </a:spcBef>
               <a:buNone/>
             </a:pPr>
-            <a:endParaRPr/>
+            <a:endParaRPr dirty="0"/>
           </a:p>
         </p:txBody>
       </p:sp>
@@ -3400,7 +3400,7 @@
               </a:spcBef>
               <a:buNone/>
             </a:pPr>
-            <a:endParaRPr/>
+            <a:endParaRPr dirty="0"/>
           </a:p>
         </p:txBody>
       </p:sp>
@@ -3506,7 +3506,7 @@
               </a:spcBef>
               <a:buNone/>
             </a:pPr>
-            <a:endParaRPr/>
+            <a:endParaRPr dirty="0"/>
           </a:p>
         </p:txBody>
       </p:sp>
@@ -3612,7 +3612,7 @@
               </a:spcBef>
               <a:buNone/>
             </a:pPr>
-            <a:endParaRPr/>
+            <a:endParaRPr dirty="0"/>
           </a:p>
         </p:txBody>
       </p:sp>
@@ -3718,7 +3718,7 @@
               </a:spcBef>
               <a:buNone/>
             </a:pPr>
-            <a:endParaRPr/>
+            <a:endParaRPr dirty="0"/>
           </a:p>
         </p:txBody>
       </p:sp>
@@ -3824,7 +3824,7 @@
               </a:spcBef>
               <a:buNone/>
             </a:pPr>
-            <a:endParaRPr/>
+            <a:endParaRPr dirty="0"/>
           </a:p>
         </p:txBody>
       </p:sp>
@@ -3930,7 +3930,7 @@
               </a:spcBef>
               <a:buNone/>
             </a:pPr>
-            <a:endParaRPr/>
+            <a:endParaRPr dirty="0"/>
           </a:p>
         </p:txBody>
       </p:sp>
@@ -4036,7 +4036,7 @@
               </a:spcBef>
               <a:buNone/>
             </a:pPr>
-            <a:endParaRPr/>
+            <a:endParaRPr dirty="0"/>
           </a:p>
         </p:txBody>
       </p:sp>
@@ -4142,7 +4142,7 @@
               </a:spcBef>
               <a:buNone/>
             </a:pPr>
-            <a:endParaRPr/>
+            <a:endParaRPr dirty="0"/>
           </a:p>
         </p:txBody>
       </p:sp>
@@ -4248,7 +4248,7 @@
               </a:spcBef>
               <a:buNone/>
             </a:pPr>
-            <a:endParaRPr/>
+            <a:endParaRPr dirty="0"/>
           </a:p>
         </p:txBody>
       </p:sp>
@@ -4354,7 +4354,7 @@
               </a:spcBef>
               <a:buNone/>
             </a:pPr>
-            <a:endParaRPr/>
+            <a:endParaRPr dirty="0"/>
           </a:p>
         </p:txBody>
       </p:sp>
@@ -4460,7 +4460,7 @@
               </a:spcBef>
               <a:buNone/>
             </a:pPr>
-            <a:endParaRPr/>
+            <a:endParaRPr dirty="0"/>
           </a:p>
         </p:txBody>
       </p:sp>
@@ -4566,7 +4566,7 @@
               </a:spcBef>
               <a:buNone/>
             </a:pPr>
-            <a:endParaRPr/>
+            <a:endParaRPr dirty="0"/>
           </a:p>
         </p:txBody>
       </p:sp>
@@ -4672,7 +4672,7 @@
               </a:spcBef>
               <a:buNone/>
             </a:pPr>
-            <a:endParaRPr/>
+            <a:endParaRPr dirty="0"/>
           </a:p>
         </p:txBody>
       </p:sp>
@@ -4819,7 +4819,7 @@
               </a:spcBef>
               <a:buNone/>
             </a:pPr>
-            <a:endParaRPr/>
+            <a:endParaRPr dirty="0"/>
           </a:p>
         </p:txBody>
       </p:sp>
@@ -4925,7 +4925,7 @@
               </a:spcBef>
               <a:buNone/>
             </a:pPr>
-            <a:endParaRPr/>
+            <a:endParaRPr dirty="0"/>
           </a:p>
         </p:txBody>
       </p:sp>
@@ -4990,7 +4990,7 @@
               </a:spcBef>
               <a:buNone/>
             </a:pPr>
-            <a:endParaRPr/>
+            <a:endParaRPr dirty="0"/>
           </a:p>
         </p:txBody>
       </p:sp>
@@ -5202,7 +5202,7 @@
               </a:spcBef>
               <a:buNone/>
             </a:pPr>
-            <a:endParaRPr/>
+            <a:endParaRPr dirty="0"/>
           </a:p>
         </p:txBody>
       </p:sp>
@@ -5308,7 +5308,7 @@
               </a:spcBef>
               <a:buNone/>
             </a:pPr>
-            <a:endParaRPr/>
+            <a:endParaRPr dirty="0"/>
           </a:p>
         </p:txBody>
       </p:sp>
@@ -5414,7 +5414,7 @@
               </a:spcBef>
               <a:buNone/>
             </a:pPr>
-            <a:endParaRPr/>
+            <a:endParaRPr dirty="0"/>
           </a:p>
         </p:txBody>
       </p:sp>
@@ -5520,7 +5520,7 @@
               </a:spcBef>
               <a:buNone/>
             </a:pPr>
-            <a:endParaRPr/>
+            <a:endParaRPr dirty="0"/>
           </a:p>
         </p:txBody>
       </p:sp>
@@ -5626,7 +5626,7 @@
               </a:spcBef>
               <a:buNone/>
             </a:pPr>
-            <a:endParaRPr/>
+            <a:endParaRPr dirty="0"/>
           </a:p>
         </p:txBody>
       </p:sp>
@@ -7590,7 +7590,7 @@
               <a:buNone/>
             </a:pPr>
             <a:r>
-              <a:rPr lang="pl" sz="3200" b="0" i="0" u="none" strike="noStrike" cap="none" baseline="0">
+              <a:rPr lang="pl" sz="3200" b="0" i="0" u="none" strike="noStrike" cap="none" baseline="0" dirty="0">
                 <a:solidFill>
                   <a:srgbClr val="FFFF00"/>
                 </a:solidFill>
@@ -7630,7 +7630,7 @@
               <a:buNone/>
             </a:pPr>
             <a:r>
-              <a:rPr lang="pl" sz="3200" b="0" i="0" u="sng" strike="noStrike" cap="none" baseline="0">
+              <a:rPr lang="pl" sz="3200" b="0" i="0" u="sng" strike="noStrike" cap="none" baseline="0" dirty="0">
                 <a:solidFill>
                   <a:srgbClr val="FFFF00"/>
                 </a:solidFill>
@@ -7640,7 +7640,20 @@
                 <a:sym typeface="Cabin"/>
                 <a:hlinkClick r:id="rId3"/>
               </a:rPr>
-              <a:t>www.py4e.com</a:t>
+              <a:t>www.py4e.</a:t>
+            </a:r>
+            <a:r>
+              <a:rPr lang="en-US" sz="3200" b="0" i="0" u="sng" strike="noStrike" cap="none" baseline="0" dirty="0">
+                <a:solidFill>
+                  <a:srgbClr val="FFFF00"/>
+                </a:solidFill>
+                <a:latin typeface="Arial" charset="0"/>
+                <a:ea typeface="Arial" charset="0"/>
+                <a:cs typeface="Arial" charset="0"/>
+                <a:sym typeface="Cabin"/>
+                <a:hlinkClick r:id="rId3"/>
+              </a:rPr>
+              <a:t>pl</a:t>
             </a:r>
             <a:endParaRPr lang="pl" sz="3200" u="sng" strike="noStrike" cap="none" dirty="0">
               <a:solidFill>
@@ -7650,7 +7663,7 @@
               <a:ea typeface="Arial" charset="0"/>
               <a:cs typeface="Arial" charset="0"/>
               <a:sym typeface="Cabin"/>
-              <a:hlinkClick r:id="rId3"/>
+              <a:hlinkClick r:id="rId4"/>
             </a:endParaRPr>
           </a:p>
         </p:txBody>
@@ -7662,7 +7675,7 @@
           <p:nvPr/>
         </p:nvPicPr>
         <p:blipFill rotWithShape="1">
-          <a:blip r:embed="rId4">
+          <a:blip r:embed="rId5">
             <a:alphaModFix/>
           </a:blip>
           <a:srcRect/>
@@ -7689,7 +7702,7 @@
           <p:nvPr/>
         </p:nvPicPr>
         <p:blipFill rotWithShape="1">
-          <a:blip r:embed="rId5">
+          <a:blip r:embed="rId6">
             <a:alphaModFix/>
           </a:blip>
           <a:srcRect/>
@@ -9947,7 +9960,7 @@
         <p:spPr>
           <a:xfrm>
             <a:off x="574950" y="719847"/>
-            <a:ext cx="9772499" cy="7529208"/>
+            <a:ext cx="9933826" cy="7529208"/>
           </a:xfrm>
           <a:prstGeom prst="rect">
             <a:avLst/>
@@ -9970,7 +9983,7 @@
               <a:buSzPct val="25000"/>
             </a:pPr>
             <a:r>
-              <a:rPr lang="pl" sz="2800" b="0" i="0" u="none" baseline="0">
+              <a:rPr lang="pl-PL" sz="2800" b="0" i="0" u="none" baseline="0" dirty="0">
                 <a:solidFill>
                   <a:srgbClr val="00FF00"/>
                 </a:solidFill>
@@ -9979,7 +9992,7 @@
                 <a:cs typeface="Courier"/>
                 <a:sym typeface="Courier New"/>
               </a:rPr>
-              <a:t>name = input('Nazwa pliku:')</a:t>
+              <a:t>name = input('Podaj nazwę pliku: ')</a:t>
             </a:r>
           </a:p>
           <a:p>
@@ -9990,7 +10003,7 @@
               <a:buSzPct val="25000"/>
             </a:pPr>
             <a:r>
-              <a:rPr lang="pl" sz="2800" b="0" i="0" u="none" baseline="0">
+              <a:rPr lang="pl-PL" sz="2800" b="0" i="0" u="none" baseline="0" dirty="0">
                 <a:solidFill>
                   <a:srgbClr val="00FF00"/>
                 </a:solidFill>
@@ -9999,11 +10012,25 @@
                 <a:cs typeface="Courier"/>
                 <a:sym typeface="Courier New"/>
               </a:rPr>
-              <a:t>handle = open(name)</a:t>
-            </a:r>
-          </a:p>
-          <a:p>
-            <a:pPr lvl="0" algn="ctr" rtl="0"/>
+              <a:t>handle = open(name, 'r')</a:t>
+            </a:r>
+            <a:endParaRPr lang="en-US" sz="2800" b="0" i="0" u="none" baseline="0" dirty="0">
+              <a:solidFill>
+                <a:srgbClr val="00FF00"/>
+              </a:solidFill>
+              <a:latin typeface="Courier"/>
+              <a:ea typeface="Courier"/>
+              <a:cs typeface="Courier"/>
+              <a:sym typeface="Courier New"/>
+            </a:endParaRPr>
+          </a:p>
+          <a:p>
+            <a:pPr lvl="0" algn="l" rtl="0">
+              <a:buClr>
+                <a:srgbClr val="00FF00"/>
+              </a:buClr>
+              <a:buSzPct val="25000"/>
+            </a:pPr>
             <a:endParaRPr lang="pl" sz="2800" dirty="0">
               <a:solidFill>
                 <a:srgbClr val="00FF00"/>
@@ -10022,7 +10049,7 @@
               <a:buSzPct val="25000"/>
             </a:pPr>
             <a:r>
-              <a:rPr lang="pl" sz="2800" b="0" i="0" u="none" baseline="0">
+              <a:rPr lang="pl" sz="2800" b="0" i="0" u="none" baseline="0" dirty="0">
                 <a:solidFill>
                   <a:srgbClr val="FF00FF"/>
                 </a:solidFill>
@@ -10042,7 +10069,7 @@
               <a:buSzPct val="25000"/>
             </a:pPr>
             <a:r>
-              <a:rPr lang="pl" sz="2800" b="0" i="0" u="none" baseline="0">
+              <a:rPr lang="en-US" sz="2800" b="0" i="0" u="none" baseline="0" dirty="0">
                 <a:solidFill>
                   <a:srgbClr val="FF00FF"/>
                 </a:solidFill>
@@ -10062,7 +10089,7 @@
               <a:buSzPct val="25000"/>
             </a:pPr>
             <a:r>
-              <a:rPr lang="pl" sz="2800" b="0" i="0" u="none" baseline="0">
+              <a:rPr lang="en-US" sz="2800" b="0" i="0" u="none" baseline="0" dirty="0">
                 <a:solidFill>
                   <a:srgbClr val="FF00FF"/>
                 </a:solidFill>
@@ -10071,18 +10098,10 @@
                 <a:cs typeface="Courier"/>
                 <a:sym typeface="Courier New"/>
               </a:rPr>
-              <a:t>    words = line.split()</a:t>
-            </a:r>
-          </a:p>
-          <a:p>
-            <a:pPr lvl="0" algn="l" rtl="0">
-              <a:buClr>
-                <a:srgbClr val="00FF00"/>
-              </a:buClr>
-              <a:buSzPct val="25000"/>
-            </a:pPr>
-            <a:r>
-              <a:rPr lang="pl" sz="2800" b="0" i="0" u="none" baseline="0">
+              <a:t>    line = </a:t>
+            </a:r>
+            <a:r>
+              <a:rPr lang="en-US" sz="2800" b="0" i="0" u="none" baseline="0" dirty="0" err="1">
                 <a:solidFill>
                   <a:srgbClr val="FF00FF"/>
                 </a:solidFill>
@@ -10091,18 +10110,10 @@
                 <a:cs typeface="Courier"/>
                 <a:sym typeface="Courier New"/>
               </a:rPr>
-              <a:t>    for word in words:</a:t>
-            </a:r>
-          </a:p>
-          <a:p>
-            <a:pPr lvl="0" algn="l" rtl="0">
-              <a:buClr>
-                <a:srgbClr val="00FF00"/>
-              </a:buClr>
-              <a:buSzPct val="25000"/>
-            </a:pPr>
-            <a:r>
-              <a:rPr lang="pl" sz="2800" b="0" i="0" u="none" baseline="0">
+              <a:t>line.lower</a:t>
+            </a:r>
+            <a:r>
+              <a:rPr lang="en-US" sz="2800" b="0" i="0" u="none" baseline="0" dirty="0">
                 <a:solidFill>
                   <a:srgbClr val="FF00FF"/>
                 </a:solidFill>
@@ -10111,7 +10122,7 @@
                 <a:cs typeface="Courier"/>
                 <a:sym typeface="Courier New"/>
               </a:rPr>
-              <a:t>        counts[word] = counts.get(word,0) + 1</a:t>
+              <a:t>()</a:t>
             </a:r>
           </a:p>
           <a:p>
@@ -10119,6 +10130,115 @@
               <a:buClr>
                 <a:srgbClr val="00FF00"/>
               </a:buClr>
+              <a:buSzPct val="25000"/>
+            </a:pPr>
+            <a:r>
+              <a:rPr lang="en-US" sz="2800" b="0" i="0" u="none" baseline="0" dirty="0">
+                <a:solidFill>
+                  <a:srgbClr val="FF00FF"/>
+                </a:solidFill>
+                <a:latin typeface="Courier"/>
+                <a:ea typeface="Courier"/>
+                <a:cs typeface="Courier"/>
+                <a:sym typeface="Courier New"/>
+              </a:rPr>
+              <a:t>    words = </a:t>
+            </a:r>
+            <a:r>
+              <a:rPr lang="en-US" sz="2800" b="0" i="0" u="none" baseline="0" dirty="0" err="1">
+                <a:solidFill>
+                  <a:srgbClr val="FF00FF"/>
+                </a:solidFill>
+                <a:latin typeface="Courier"/>
+                <a:ea typeface="Courier"/>
+                <a:cs typeface="Courier"/>
+                <a:sym typeface="Courier New"/>
+              </a:rPr>
+              <a:t>line.split</a:t>
+            </a:r>
+            <a:r>
+              <a:rPr lang="en-US" sz="2800" b="0" i="0" u="none" baseline="0" dirty="0">
+                <a:solidFill>
+                  <a:srgbClr val="FF00FF"/>
+                </a:solidFill>
+                <a:latin typeface="Courier"/>
+                <a:ea typeface="Courier"/>
+                <a:cs typeface="Courier"/>
+                <a:sym typeface="Courier New"/>
+              </a:rPr>
+              <a:t>()</a:t>
+            </a:r>
+          </a:p>
+          <a:p>
+            <a:pPr lvl="0" algn="l" rtl="0">
+              <a:buClr>
+                <a:srgbClr val="00FF00"/>
+              </a:buClr>
+              <a:buSzPct val="25000"/>
+            </a:pPr>
+            <a:r>
+              <a:rPr lang="en-US" sz="2800" b="0" i="0" u="none" baseline="0" dirty="0">
+                <a:solidFill>
+                  <a:srgbClr val="FF00FF"/>
+                </a:solidFill>
+                <a:latin typeface="Courier"/>
+                <a:ea typeface="Courier"/>
+                <a:cs typeface="Courier"/>
+                <a:sym typeface="Courier New"/>
+              </a:rPr>
+              <a:t>    for word in words:</a:t>
+            </a:r>
+          </a:p>
+          <a:p>
+            <a:pPr lvl="0" algn="l" rtl="0">
+              <a:buClr>
+                <a:srgbClr val="00FF00"/>
+              </a:buClr>
+              <a:buSzPct val="25000"/>
+            </a:pPr>
+            <a:r>
+              <a:rPr lang="en-US" sz="2800" b="0" i="0" u="none" baseline="0" dirty="0">
+                <a:solidFill>
+                  <a:srgbClr val="FF00FF"/>
+                </a:solidFill>
+                <a:latin typeface="Courier"/>
+                <a:ea typeface="Courier"/>
+                <a:cs typeface="Courier"/>
+                <a:sym typeface="Courier New"/>
+              </a:rPr>
+              <a:t>        counts[word] = </a:t>
+            </a:r>
+            <a:r>
+              <a:rPr lang="en-US" sz="2800" b="0" i="0" u="none" baseline="0" dirty="0" err="1">
+                <a:solidFill>
+                  <a:srgbClr val="FF00FF"/>
+                </a:solidFill>
+                <a:latin typeface="Courier"/>
+                <a:ea typeface="Courier"/>
+                <a:cs typeface="Courier"/>
+                <a:sym typeface="Courier New"/>
+              </a:rPr>
+              <a:t>counts.get</a:t>
+            </a:r>
+            <a:r>
+              <a:rPr lang="en-US" sz="2800" b="0" i="0" u="none" baseline="0" dirty="0">
+                <a:solidFill>
+                  <a:srgbClr val="FF00FF"/>
+                </a:solidFill>
+                <a:latin typeface="Courier"/>
+                <a:ea typeface="Courier"/>
+                <a:cs typeface="Courier"/>
+                <a:sym typeface="Courier New"/>
+              </a:rPr>
+              <a:t>(word, 0) + 1</a:t>
+            </a:r>
+          </a:p>
+          <a:p>
+            <a:pPr lvl="0" algn="l" rtl="0">
+              <a:buClr>
+                <a:srgbClr val="00FF00"/>
+              </a:buClr>
+              <a:buSzPct val="25000"/>
             </a:pPr>
             <a:endParaRPr lang="pl" sz="2800" dirty="0">
               <a:solidFill>
@@ -10138,7 +10258,7 @@
               <a:buSzPct val="25000"/>
             </a:pPr>
             <a:r>
-              <a:rPr lang="pl" sz="2800" b="0" i="0" u="none" baseline="0">
+              <a:rPr lang="en-US" sz="2800" b="0" i="0" u="none" baseline="0" dirty="0" err="1">
                 <a:solidFill>
                   <a:srgbClr val="00FFFF"/>
                 </a:solidFill>
@@ -10147,18 +10267,10 @@
                 <a:cs typeface="Courier"/>
                 <a:sym typeface="Courier New"/>
               </a:rPr>
-              <a:t>bigcount = None</a:t>
-            </a:r>
-          </a:p>
-          <a:p>
-            <a:pPr lvl="0" algn="l" rtl="0">
-              <a:buClr>
-                <a:srgbClr val="00FF00"/>
-              </a:buClr>
-              <a:buSzPct val="25000"/>
-            </a:pPr>
-            <a:r>
-              <a:rPr lang="pl" sz="2800" b="0" i="0" u="none" baseline="0">
+              <a:t>bigcount</a:t>
+            </a:r>
+            <a:r>
+              <a:rPr lang="en-US" sz="2800" b="0" i="0" u="none" baseline="0" dirty="0">
                 <a:solidFill>
                   <a:srgbClr val="00FFFF"/>
                 </a:solidFill>
@@ -10167,7 +10279,7 @@
                 <a:cs typeface="Courier"/>
                 <a:sym typeface="Courier New"/>
               </a:rPr>
-              <a:t>bigword = None</a:t>
+              <a:t> = None</a:t>
             </a:r>
           </a:p>
           <a:p>
@@ -10178,7 +10290,7 @@
               <a:buSzPct val="25000"/>
             </a:pPr>
             <a:r>
-              <a:rPr lang="pl" sz="2800" b="0" i="0" u="none" baseline="0">
+              <a:rPr lang="en-US" sz="2800" b="0" i="0" u="none" baseline="0" dirty="0" err="1">
                 <a:solidFill>
                   <a:srgbClr val="00FFFF"/>
                 </a:solidFill>
@@ -10187,18 +10299,10 @@
                 <a:cs typeface="Courier"/>
                 <a:sym typeface="Courier New"/>
               </a:rPr>
-              <a:t>for word,count in counts.items():</a:t>
-            </a:r>
-          </a:p>
-          <a:p>
-            <a:pPr lvl="0" algn="l" rtl="0">
-              <a:buClr>
-                <a:srgbClr val="00FF00"/>
-              </a:buClr>
-              <a:buSzPct val="25000"/>
-            </a:pPr>
-            <a:r>
-              <a:rPr lang="pl" sz="2800" b="0" i="0" u="none" baseline="0">
+              <a:t>bigword</a:t>
+            </a:r>
+            <a:r>
+              <a:rPr lang="en-US" sz="2800" b="0" i="0" u="none" baseline="0" dirty="0">
                 <a:solidFill>
                   <a:srgbClr val="00FFFF"/>
                 </a:solidFill>
@@ -10207,7 +10311,7 @@
                 <a:cs typeface="Courier"/>
                 <a:sym typeface="Courier New"/>
               </a:rPr>
-              <a:t>    if bigcount is None or count &gt; bigcount:</a:t>
+              <a:t> = None</a:t>
             </a:r>
           </a:p>
           <a:p>
@@ -10218,7 +10322,7 @@
               <a:buSzPct val="25000"/>
             </a:pPr>
             <a:r>
-              <a:rPr lang="pl" sz="2800" b="0" i="0" u="none" baseline="0">
+              <a:rPr lang="en-US" sz="2800" b="0" i="0" u="none" baseline="0" dirty="0">
                 <a:solidFill>
                   <a:srgbClr val="00FFFF"/>
                 </a:solidFill>
@@ -10227,18 +10331,10 @@
                 <a:cs typeface="Courier"/>
                 <a:sym typeface="Courier New"/>
               </a:rPr>
-              <a:t>        bigword = None</a:t>
-            </a:r>
-          </a:p>
-          <a:p>
-            <a:pPr lvl="0" algn="l" rtl="0">
-              <a:buClr>
-                <a:srgbClr val="00FF00"/>
-              </a:buClr>
-              <a:buSzPct val="25000"/>
-            </a:pPr>
-            <a:r>
-              <a:rPr lang="pl" sz="2800" b="0" i="0" u="none" baseline="0">
+              <a:t>for word, count in list(</a:t>
+            </a:r>
+            <a:r>
+              <a:rPr lang="en-US" sz="2800" b="0" i="0" u="none" baseline="0" dirty="0" err="1">
                 <a:solidFill>
                   <a:srgbClr val="00FFFF"/>
                 </a:solidFill>
@@ -10247,7 +10343,19 @@
                 <a:cs typeface="Courier"/>
                 <a:sym typeface="Courier New"/>
               </a:rPr>
-              <a:t>        bigcount = count</a:t>
+              <a:t>counts.items</a:t>
+            </a:r>
+            <a:r>
+              <a:rPr lang="en-US" sz="2800" b="0" i="0" u="none" baseline="0" dirty="0">
+                <a:solidFill>
+                  <a:srgbClr val="00FFFF"/>
+                </a:solidFill>
+                <a:latin typeface="Courier"/>
+                <a:ea typeface="Courier"/>
+                <a:cs typeface="Courier"/>
+                <a:sym typeface="Courier New"/>
+              </a:rPr>
+              <a:t>()):</a:t>
             </a:r>
           </a:p>
           <a:p>
@@ -10255,6 +10363,163 @@
               <a:buClr>
                 <a:srgbClr val="00FF00"/>
               </a:buClr>
+              <a:buSzPct val="25000"/>
+            </a:pPr>
+            <a:r>
+              <a:rPr lang="en-US" sz="2800" b="0" i="0" u="none" baseline="0" dirty="0">
+                <a:solidFill>
+                  <a:srgbClr val="00FFFF"/>
+                </a:solidFill>
+                <a:latin typeface="Courier"/>
+                <a:ea typeface="Courier"/>
+                <a:cs typeface="Courier"/>
+                <a:sym typeface="Courier New"/>
+              </a:rPr>
+              <a:t>    if </a:t>
+            </a:r>
+            <a:r>
+              <a:rPr lang="en-US" sz="2800" b="0" i="0" u="none" baseline="0" dirty="0" err="1">
+                <a:solidFill>
+                  <a:srgbClr val="00FFFF"/>
+                </a:solidFill>
+                <a:latin typeface="Courier"/>
+                <a:ea typeface="Courier"/>
+                <a:cs typeface="Courier"/>
+                <a:sym typeface="Courier New"/>
+              </a:rPr>
+              <a:t>bigcount</a:t>
+            </a:r>
+            <a:r>
+              <a:rPr lang="en-US" sz="2800" b="0" i="0" u="none" baseline="0" dirty="0">
+                <a:solidFill>
+                  <a:srgbClr val="00FFFF"/>
+                </a:solidFill>
+                <a:latin typeface="Courier"/>
+                <a:ea typeface="Courier"/>
+                <a:cs typeface="Courier"/>
+                <a:sym typeface="Courier New"/>
+              </a:rPr>
+              <a:t> is None or count &gt; </a:t>
+            </a:r>
+            <a:r>
+              <a:rPr lang="en-US" sz="2800" b="0" i="0" u="none" baseline="0" dirty="0" err="1">
+                <a:solidFill>
+                  <a:srgbClr val="00FFFF"/>
+                </a:solidFill>
+                <a:latin typeface="Courier"/>
+                <a:ea typeface="Courier"/>
+                <a:cs typeface="Courier"/>
+                <a:sym typeface="Courier New"/>
+              </a:rPr>
+              <a:t>bigcount</a:t>
+            </a:r>
+            <a:r>
+              <a:rPr lang="en-US" sz="2800" b="0" i="0" u="none" baseline="0" dirty="0">
+                <a:solidFill>
+                  <a:srgbClr val="00FFFF"/>
+                </a:solidFill>
+                <a:latin typeface="Courier"/>
+                <a:ea typeface="Courier"/>
+                <a:cs typeface="Courier"/>
+                <a:sym typeface="Courier New"/>
+              </a:rPr>
+              <a:t>:</a:t>
+            </a:r>
+          </a:p>
+          <a:p>
+            <a:pPr lvl="0" algn="l" rtl="0">
+              <a:buClr>
+                <a:srgbClr val="00FF00"/>
+              </a:buClr>
+              <a:buSzPct val="25000"/>
+            </a:pPr>
+            <a:r>
+              <a:rPr lang="en-US" sz="2800" b="0" i="0" u="none" baseline="0" dirty="0">
+                <a:solidFill>
+                  <a:srgbClr val="00FFFF"/>
+                </a:solidFill>
+                <a:latin typeface="Courier"/>
+                <a:ea typeface="Courier"/>
+                <a:cs typeface="Courier"/>
+                <a:sym typeface="Courier New"/>
+              </a:rPr>
+              <a:t>        </a:t>
+            </a:r>
+            <a:r>
+              <a:rPr lang="en-US" sz="2800" b="0" i="0" u="none" baseline="0" dirty="0" err="1">
+                <a:solidFill>
+                  <a:srgbClr val="00FFFF"/>
+                </a:solidFill>
+                <a:latin typeface="Courier"/>
+                <a:ea typeface="Courier"/>
+                <a:cs typeface="Courier"/>
+                <a:sym typeface="Courier New"/>
+              </a:rPr>
+              <a:t>bigword</a:t>
+            </a:r>
+            <a:r>
+              <a:rPr lang="en-US" sz="2800" b="0" i="0" u="none" baseline="0" dirty="0">
+                <a:solidFill>
+                  <a:srgbClr val="00FFFF"/>
+                </a:solidFill>
+                <a:latin typeface="Courier"/>
+                <a:ea typeface="Courier"/>
+                <a:cs typeface="Courier"/>
+                <a:sym typeface="Courier New"/>
+              </a:rPr>
+              <a:t> = word</a:t>
+            </a:r>
+          </a:p>
+          <a:p>
+            <a:pPr lvl="0" algn="l" rtl="0">
+              <a:buClr>
+                <a:srgbClr val="00FF00"/>
+              </a:buClr>
+              <a:buSzPct val="25000"/>
+            </a:pPr>
+            <a:r>
+              <a:rPr lang="en-US" sz="2800" b="0" i="0" u="none" baseline="0" dirty="0">
+                <a:solidFill>
+                  <a:srgbClr val="00FFFF"/>
+                </a:solidFill>
+                <a:latin typeface="Courier"/>
+                <a:ea typeface="Courier"/>
+                <a:cs typeface="Courier"/>
+                <a:sym typeface="Courier New"/>
+              </a:rPr>
+              <a:t>        </a:t>
+            </a:r>
+            <a:r>
+              <a:rPr lang="en-US" sz="2800" b="0" i="0" u="none" baseline="0" dirty="0" err="1">
+                <a:solidFill>
+                  <a:srgbClr val="00FFFF"/>
+                </a:solidFill>
+                <a:latin typeface="Courier"/>
+                <a:ea typeface="Courier"/>
+                <a:cs typeface="Courier"/>
+                <a:sym typeface="Courier New"/>
+              </a:rPr>
+              <a:t>bigcount</a:t>
+            </a:r>
+            <a:r>
+              <a:rPr lang="en-US" sz="2800" b="0" i="0" u="none" baseline="0" dirty="0">
+                <a:solidFill>
+                  <a:srgbClr val="00FFFF"/>
+                </a:solidFill>
+                <a:latin typeface="Courier"/>
+                <a:ea typeface="Courier"/>
+                <a:cs typeface="Courier"/>
+                <a:sym typeface="Courier New"/>
+              </a:rPr>
+              <a:t> = count</a:t>
+            </a:r>
+          </a:p>
+          <a:p>
+            <a:pPr lvl="0" algn="l" rtl="0">
+              <a:buClr>
+                <a:srgbClr val="00FF00"/>
+              </a:buClr>
+              <a:buSzPct val="25000"/>
             </a:pPr>
             <a:endParaRPr lang="pl" sz="2800" dirty="0">
               <a:solidFill>
@@ -10274,7 +10539,7 @@
               <a:buSzPct val="25000"/>
             </a:pPr>
             <a:r>
-              <a:rPr lang="pl" sz="2800" b="0" i="0" u="none" baseline="0">
+              <a:rPr lang="pl" sz="2800" b="0" i="0" u="none" baseline="0" dirty="0">
                 <a:solidFill>
                   <a:srgbClr val="FF7F00"/>
                 </a:solidFill>
@@ -10296,8 +10561,8 @@
         </p:nvSpPr>
         <p:spPr>
           <a:xfrm>
-            <a:off x="10702925" y="1275907"/>
-            <a:ext cx="4820610" cy="2041451"/>
+            <a:off x="10702924" y="1275907"/>
+            <a:ext cx="5073887" cy="2041451"/>
           </a:xfrm>
           <a:prstGeom prst="rect">
             <a:avLst/>
@@ -10337,7 +10602,7 @@
               <a:buNone/>
             </a:pPr>
             <a:r>
-              <a:rPr lang="pl" sz="3600" b="0" i="0" u="none" baseline="0" dirty="0">
+              <a:rPr lang="pl" sz="2800" b="0" i="0" u="none" baseline="0" dirty="0">
                 <a:solidFill>
                   <a:srgbClr val="FFFF00"/>
                 </a:solidFill>
@@ -10349,7 +10614,7 @@
               <a:t> </a:t>
             </a:r>
             <a:r>
-              <a:rPr lang="pl" sz="3600" b="0" i="0" u="none" strike="noStrike" cap="none" baseline="0" dirty="0">
+              <a:rPr lang="pl" sz="2800" b="0" i="0" u="none" strike="noStrike" cap="none" baseline="0" dirty="0">
                 <a:solidFill>
                   <a:srgbClr val="FFFF00"/>
                 </a:solidFill>
@@ -10358,7 +10623,31 @@
                 <a:cs typeface="Arial" charset="0"/>
                 <a:sym typeface="Cabin"/>
               </a:rPr>
-              <a:t>python words.py </a:t>
+              <a:t>python</a:t>
+            </a:r>
+            <a:r>
+              <a:rPr lang="en-US" sz="2800" b="0" i="0" u="none" strike="noStrike" cap="none" baseline="0" dirty="0">
+                <a:solidFill>
+                  <a:srgbClr val="FFFF00"/>
+                </a:solidFill>
+                <a:latin typeface="Arial" charset="0"/>
+                <a:ea typeface="Arial" charset="0"/>
+                <a:cs typeface="Arial" charset="0"/>
+                <a:sym typeface="Cabin"/>
+              </a:rPr>
+              <a:t>3</a:t>
+            </a:r>
+            <a:r>
+              <a:rPr lang="pl" sz="2800" b="0" i="0" u="none" strike="noStrike" cap="none" baseline="0" dirty="0">
+                <a:solidFill>
+                  <a:srgbClr val="FFFF00"/>
+                </a:solidFill>
+                <a:latin typeface="Arial" charset="0"/>
+                <a:ea typeface="Arial" charset="0"/>
+                <a:cs typeface="Arial" charset="0"/>
+                <a:sym typeface="Cabin"/>
+              </a:rPr>
+              <a:t> words.py </a:t>
             </a:r>
           </a:p>
           <a:p>
@@ -10380,7 +10669,7 @@
               <a:buNone/>
             </a:pPr>
             <a:r>
-              <a:rPr lang="pl" sz="3600" b="0" i="0" u="none" baseline="0" dirty="0">
+              <a:rPr lang="pl" sz="2800" b="0" i="0" u="none" baseline="0" dirty="0">
                 <a:solidFill>
                   <a:srgbClr val="FFFF00"/>
                 </a:solidFill>
@@ -10392,7 +10681,7 @@
               <a:t> </a:t>
             </a:r>
             <a:r>
-              <a:rPr lang="pl" sz="3600" b="0" i="0" u="none" strike="noStrike" cap="none" baseline="0" dirty="0">
+              <a:rPr lang="pl-PL" sz="2800" b="0" i="0" u="none" strike="noStrike" cap="none" baseline="0" dirty="0">
                 <a:solidFill>
                   <a:srgbClr val="FFFF00"/>
                 </a:solidFill>
@@ -10401,10 +10690,22 @@
                 <a:cs typeface="Arial" charset="0"/>
                 <a:sym typeface="Cabin"/>
               </a:rPr>
-              <a:t>Nazwa pliku: </a:t>
-            </a:r>
-            <a:r>
-              <a:rPr lang="pl" sz="3600" b="0" i="0" u="none" strike="noStrike" cap="none" baseline="0" dirty="0">
+              <a:t>Podaj nazwę pliku</a:t>
+            </a:r>
+            <a:r>
+              <a:rPr lang="pl" sz="2800" b="0" i="0" u="none" strike="noStrike" cap="none" baseline="0" dirty="0">
+                <a:solidFill>
+                  <a:srgbClr val="FFFF00"/>
+                </a:solidFill>
+                <a:latin typeface="Arial" charset="0"/>
+                <a:ea typeface="Arial" charset="0"/>
+                <a:cs typeface="Arial" charset="0"/>
+                <a:sym typeface="Cabin"/>
+              </a:rPr>
+              <a:t>: </a:t>
+            </a:r>
+            <a:r>
+              <a:rPr lang="pl" sz="2800" b="0" i="0" u="none" strike="noStrike" cap="none" baseline="0" dirty="0">
                 <a:solidFill>
                   <a:schemeClr val="lt1"/>
                 </a:solidFill>
@@ -10435,7 +10736,7 @@
               <a:buNone/>
             </a:pPr>
             <a:r>
-              <a:rPr lang="pl" sz="3600" b="0" i="0" u="none" baseline="0" dirty="0">
+              <a:rPr lang="pl" sz="2800" b="0" i="0" u="none" baseline="0" dirty="0">
                 <a:solidFill>
                   <a:srgbClr val="FFFF00"/>
                 </a:solidFill>
@@ -10447,7 +10748,7 @@
               <a:t> </a:t>
             </a:r>
             <a:r>
-              <a:rPr lang="pl" sz="3600" b="0" i="0" u="none" strike="noStrike" cap="none" baseline="0" dirty="0">
+              <a:rPr lang="en-US" sz="2800" dirty="0">
                 <a:solidFill>
                   <a:srgbClr val="FFFF00"/>
                 </a:solidFill>
@@ -10456,8 +10757,17 @@
                 <a:cs typeface="Arial" charset="0"/>
                 <a:sym typeface="Cabin"/>
               </a:rPr>
-              <a:t>to 16</a:t>
-            </a:r>
+              <a:t>w 5</a:t>
+            </a:r>
+            <a:endParaRPr lang="pl" sz="2800" b="0" i="0" u="none" strike="noStrike" cap="none" baseline="0" dirty="0">
+              <a:solidFill>
+                <a:srgbClr val="FFFF00"/>
+              </a:solidFill>
+              <a:latin typeface="Arial" charset="0"/>
+              <a:ea typeface="Arial" charset="0"/>
+              <a:cs typeface="Arial" charset="0"/>
+              <a:sym typeface="Cabin"/>
+            </a:endParaRPr>
           </a:p>
         </p:txBody>
       </p:sp>
@@ -10510,7 +10820,7 @@
               <a:buNone/>
             </a:pPr>
             <a:r>
-              <a:rPr lang="pl" sz="3600" b="0" i="0" u="none" baseline="0" dirty="0">
+              <a:rPr lang="pl" sz="2800" b="0" i="0" u="none" baseline="0" dirty="0">
                 <a:solidFill>
                   <a:srgbClr val="FFFF00"/>
                 </a:solidFill>
@@ -10522,7 +10832,7 @@
               <a:t> </a:t>
             </a:r>
             <a:r>
-              <a:rPr lang="pl" sz="3600" b="0" i="0" u="none" strike="noStrike" cap="none" baseline="0" dirty="0">
+              <a:rPr lang="pl" sz="2800" b="0" i="0" u="none" strike="noStrike" cap="none" baseline="0" dirty="0">
                 <a:solidFill>
                   <a:srgbClr val="FFFF00"/>
                 </a:solidFill>
@@ -10531,7 +10841,31 @@
                 <a:cs typeface="Arial" charset="0"/>
                 <a:sym typeface="Cabin"/>
               </a:rPr>
-              <a:t>python words.py </a:t>
+              <a:t>python</a:t>
+            </a:r>
+            <a:r>
+              <a:rPr lang="en-US" sz="2800" b="0" i="0" u="none" strike="noStrike" cap="none" baseline="0" dirty="0">
+                <a:solidFill>
+                  <a:srgbClr val="FFFF00"/>
+                </a:solidFill>
+                <a:latin typeface="Arial" charset="0"/>
+                <a:ea typeface="Arial" charset="0"/>
+                <a:cs typeface="Arial" charset="0"/>
+                <a:sym typeface="Cabin"/>
+              </a:rPr>
+              <a:t>3</a:t>
+            </a:r>
+            <a:r>
+              <a:rPr lang="pl" sz="2800" b="0" i="0" u="none" strike="noStrike" cap="none" baseline="0" dirty="0">
+                <a:solidFill>
+                  <a:srgbClr val="FFFF00"/>
+                </a:solidFill>
+                <a:latin typeface="Arial" charset="0"/>
+                <a:ea typeface="Arial" charset="0"/>
+                <a:cs typeface="Arial" charset="0"/>
+                <a:sym typeface="Cabin"/>
+              </a:rPr>
+              <a:t> words.py </a:t>
             </a:r>
           </a:p>
           <a:p>
@@ -10553,7 +10887,7 @@
               <a:buNone/>
             </a:pPr>
             <a:r>
-              <a:rPr lang="pl" sz="3600" b="0" i="0" u="none" baseline="0" dirty="0">
+              <a:rPr lang="pl" sz="2800" b="0" i="0" u="none" baseline="0" dirty="0">
                 <a:solidFill>
                   <a:srgbClr val="FFFF00"/>
                 </a:solidFill>
@@ -10565,7 +10899,7 @@
               <a:t> </a:t>
             </a:r>
             <a:r>
-              <a:rPr lang="pl" sz="3600" b="0" i="0" u="none" strike="noStrike" cap="none" baseline="0" dirty="0">
+              <a:rPr lang="pl-PL" sz="2800" b="0" i="0" u="none" strike="noStrike" cap="none" baseline="0" dirty="0">
                 <a:solidFill>
                   <a:srgbClr val="FFFF00"/>
                 </a:solidFill>
@@ -10574,10 +10908,22 @@
                 <a:cs typeface="Arial" charset="0"/>
                 <a:sym typeface="Cabin"/>
               </a:rPr>
-              <a:t>Nazwa pliku: </a:t>
-            </a:r>
-            <a:r>
-              <a:rPr lang="pl" sz="3600" b="0" i="0" u="none" strike="noStrike" cap="none" baseline="0" dirty="0">
+              <a:t>Podaj nazwę pliku</a:t>
+            </a:r>
+            <a:r>
+              <a:rPr lang="pl" sz="2800" b="0" i="0" u="none" strike="noStrike" cap="none" baseline="0" dirty="0">
+                <a:solidFill>
+                  <a:srgbClr val="FFFF00"/>
+                </a:solidFill>
+                <a:latin typeface="Arial" charset="0"/>
+                <a:ea typeface="Arial" charset="0"/>
+                <a:cs typeface="Arial" charset="0"/>
+                <a:sym typeface="Cabin"/>
+              </a:rPr>
+              <a:t>: </a:t>
+            </a:r>
+            <a:r>
+              <a:rPr lang="pl" sz="2800" b="0" i="0" u="none" strike="noStrike" cap="none" baseline="0" dirty="0">
                 <a:solidFill>
                   <a:schemeClr val="lt1"/>
                 </a:solidFill>
@@ -10608,7 +10954,7 @@
               <a:buNone/>
             </a:pPr>
             <a:r>
-              <a:rPr lang="pl" sz="3600" b="0" i="0" u="none" baseline="0" dirty="0">
+              <a:rPr lang="pl" sz="2800" b="0" i="0" u="none" baseline="0" dirty="0">
                 <a:solidFill>
                   <a:srgbClr val="FFFF00"/>
                 </a:solidFill>
@@ -10620,7 +10966,7 @@
               <a:t> </a:t>
             </a:r>
             <a:r>
-              <a:rPr lang="pl" sz="3600" b="0" i="0" u="none" strike="noStrike" cap="none" baseline="0" dirty="0">
+              <a:rPr lang="pl" sz="2800" b="0" i="0" u="none" strike="noStrike" cap="none" baseline="0" dirty="0">
                 <a:solidFill>
                   <a:srgbClr val="FFFF00"/>
                 </a:solidFill>
@@ -11103,7 +11449,7 @@
               <a:buFont typeface="Cabin"/>
               <a:buNone/>
             </a:pPr>
-            <a:endParaRPr/>
+            <a:endParaRPr dirty="0"/>
           </a:p>
           <a:p>
             <a:pPr marL="0" marR="0" lvl="0" indent="0" algn="ctr" rtl="0">
@@ -12170,6 +12516,18 @@
               <a:buChar char="•"/>
             </a:pPr>
             <a:r>
+              <a:rPr lang="en-US" sz="3000" dirty="0">
+                <a:solidFill>
+                  <a:srgbClr val="FFFF00"/>
+                </a:solidFill>
+                <a:latin typeface="Arial" charset="0"/>
+                <a:ea typeface="Arial" charset="0"/>
+                <a:cs typeface="Arial" charset="0"/>
+                <a:sym typeface="Cabin"/>
+              </a:rPr>
+              <a:t>P</a:t>
+            </a:r>
+            <a:r>
               <a:rPr lang="pl" sz="3000" b="0" i="0" u="none" strike="noStrike" cap="none" baseline="0" dirty="0">
                 <a:solidFill>
                   <a:srgbClr val="FFFF00"/>
@@ -12179,7 +12537,7 @@
                 <a:cs typeface="Arial" charset="0"/>
                 <a:sym typeface="Cabin"/>
               </a:rPr>
-              <a:t>pamięć pomocnicza:</a:t>
+              <a:t>amięć pomocnicza:</a:t>
             </a:r>
             <a:r>
               <a:rPr lang="pl" sz="3000" b="0" i="0" u="none" strike="noStrike" cap="none" baseline="0" dirty="0">
@@ -12622,7 +12980,7 @@
               <a:buFont typeface="Cabin"/>
               <a:buNone/>
             </a:pPr>
-            <a:endParaRPr/>
+            <a:endParaRPr dirty="0"/>
           </a:p>
           <a:p>
             <a:pPr marL="0" marR="0" lvl="0" indent="0" algn="ctr" rtl="0">
@@ -13253,8 +13611,8 @@
         </p:nvSpPr>
         <p:spPr>
           <a:xfrm>
-            <a:off x="7670800" y="4234770"/>
-            <a:ext cx="2768599" cy="1270000"/>
+            <a:off x="7489823" y="4031337"/>
+            <a:ext cx="3635372" cy="1473433"/>
           </a:xfrm>
           <a:prstGeom prst="wedgeEllipseCallout">
             <a:avLst>
@@ -13301,7 +13659,7 @@
               <a:buNone/>
             </a:pPr>
             <a:r>
-              <a:rPr lang="pl" sz="2600" b="0" i="0" u="none" strike="noStrike" cap="none" baseline="0">
+              <a:rPr lang="pl" sz="2600" b="0" i="0" u="none" strike="noStrike" cap="none" baseline="0" dirty="0">
                 <a:solidFill>
                   <a:srgbClr val="00FF00"/>
                 </a:solidFill>
@@ -13310,8 +13668,53 @@
                 <a:cs typeface="Arial" charset="0"/>
                 <a:sym typeface="Cabin"/>
               </a:rPr>
-              <a:t>if x&lt; 3: print</a:t>
-            </a:r>
+              <a:t>if x</a:t>
+            </a:r>
+            <a:r>
+              <a:rPr lang="en-US" sz="2600" b="0" i="0" u="none" strike="noStrike" cap="none" baseline="0" dirty="0">
+                <a:solidFill>
+                  <a:srgbClr val="00FF00"/>
+                </a:solidFill>
+                <a:latin typeface="Arial" charset="0"/>
+                <a:ea typeface="Arial" charset="0"/>
+                <a:cs typeface="Arial" charset="0"/>
+                <a:sym typeface="Cabin"/>
+              </a:rPr>
+              <a:t> </a:t>
+            </a:r>
+            <a:r>
+              <a:rPr lang="pl" sz="2600" b="0" i="0" u="none" strike="noStrike" cap="none" baseline="0" dirty="0">
+                <a:solidFill>
+                  <a:srgbClr val="00FF00"/>
+                </a:solidFill>
+                <a:latin typeface="Arial" charset="0"/>
+                <a:ea typeface="Arial" charset="0"/>
+                <a:cs typeface="Arial" charset="0"/>
+                <a:sym typeface="Cabin"/>
+              </a:rPr>
+              <a:t>&lt; 3: print</a:t>
+            </a:r>
+            <a:r>
+              <a:rPr lang="en-US" sz="2600" b="0" i="0" u="none" strike="noStrike" cap="none" baseline="0" dirty="0">
+                <a:solidFill>
+                  <a:srgbClr val="00FF00"/>
+                </a:solidFill>
+                <a:latin typeface="Arial" charset="0"/>
+                <a:ea typeface="Arial" charset="0"/>
+                <a:cs typeface="Arial" charset="0"/>
+                <a:sym typeface="Cabin"/>
+              </a:rPr>
+              <a:t>(…)</a:t>
+            </a:r>
+            <a:endParaRPr lang="pl" sz="2600" b="0" i="0" u="none" strike="noStrike" cap="none" baseline="0" dirty="0">
+              <a:solidFill>
+                <a:srgbClr val="00FF00"/>
+              </a:solidFill>
+              <a:latin typeface="Arial" charset="0"/>
+              <a:ea typeface="Arial" charset="0"/>
+              <a:cs typeface="Arial" charset="0"/>
+              <a:sym typeface="Cabin"/>
+            </a:endParaRPr>
           </a:p>
         </p:txBody>
       </p:sp>
@@ -13563,7 +13966,7 @@
               </a:spcAft>
               <a:buNone/>
             </a:pPr>
-            <a:endParaRPr/>
+            <a:endParaRPr dirty="0"/>
           </a:p>
         </p:txBody>
       </p:sp>
@@ -14163,7 +14566,7 @@
               </a:spcAft>
               <a:buNone/>
             </a:pPr>
-            <a:endParaRPr/>
+            <a:endParaRPr dirty="0"/>
           </a:p>
         </p:txBody>
       </p:sp>
@@ -14551,7 +14954,7 @@
               <a:buFont typeface="Cabin"/>
               <a:buNone/>
             </a:pPr>
-            <a:endParaRPr/>
+            <a:endParaRPr dirty="0"/>
           </a:p>
           <a:p>
             <a:pPr marL="0" marR="0" lvl="0" indent="0" algn="ctr" rtl="0">
@@ -15162,107 +15565,6 @@
                 <a:sym typeface="Cabin"/>
               </a:rPr>
               <a:t>maszynowy</a:t>
-            </a:r>
-          </a:p>
-        </p:txBody>
-      </p:sp>
-      <p:sp>
-        <p:nvSpPr>
-          <p:cNvPr id="17" name="Shape 410"/>
-          <p:cNvSpPr/>
-          <p:nvPr/>
-        </p:nvSpPr>
-        <p:spPr>
-          <a:xfrm>
-            <a:off x="7670800" y="3962400"/>
-            <a:ext cx="2768599" cy="1270000"/>
-          </a:xfrm>
-          <a:prstGeom prst="wedgeEllipseCallout">
-            <a:avLst>
-              <a:gd name="adj1" fmla="val -23159"/>
-              <a:gd name="adj2" fmla="val 71986"/>
-            </a:avLst>
-          </a:prstGeom>
-          <a:solidFill>
-            <a:schemeClr val="tx1">
-              <a:lumMod val="75000"/>
-            </a:schemeClr>
-          </a:solidFill>
-          <a:ln w="50800" cap="rnd" cmpd="sng">
-            <a:solidFill>
-              <a:srgbClr val="FF9900"/>
-            </a:solidFill>
-            <a:prstDash val="solid"/>
-            <a:miter/>
-            <a:headEnd type="none" w="med" len="med"/>
-            <a:tailEnd type="none" w="med" len="med"/>
-          </a:ln>
-        </p:spPr>
-        <p:txBody>
-          <a:bodyPr lIns="0" tIns="0" rIns="0" bIns="0" anchor="ctr" anchorCtr="0">
-            <a:noAutofit/>
-          </a:bodyPr>
-          <a:lstStyle/>
-          <a:p>
-            <a:pPr marL="0" marR="0" lvl="0" indent="0" algn="ctr" rtl="0">
-              <a:lnSpc>
-                <a:spcPct val="100000"/>
-              </a:lnSpc>
-              <a:spcBef>
-                <a:spcPts val="0"/>
-              </a:spcBef>
-              <a:spcAft>
-                <a:spcPts val="0"/>
-              </a:spcAft>
-              <a:buClr>
-                <a:srgbClr val="008080"/>
-              </a:buClr>
-              <a:buSzPct val="25000"/>
-              <a:buFont typeface="Courier New"/>
-              <a:buNone/>
-            </a:pPr>
-            <a:r>
-              <a:rPr lang="pl" sz="2600" b="1" i="0" u="none" strike="noStrike" cap="none" baseline="0">
-                <a:solidFill>
-                  <a:schemeClr val="accent4"/>
-                </a:solidFill>
-                <a:latin typeface="Courier"/>
-                <a:ea typeface="Courier"/>
-                <a:cs typeface="Courier"/>
-                <a:sym typeface="Courier New"/>
-              </a:rPr>
-              <a:t>01001001</a:t>
-            </a:r>
-          </a:p>
-          <a:p>
-            <a:pPr marL="0" marR="0" lvl="0" indent="0" algn="ctr" rtl="0">
-              <a:lnSpc>
-                <a:spcPct val="100000"/>
-              </a:lnSpc>
-              <a:spcBef>
-                <a:spcPts val="0"/>
-              </a:spcBef>
-              <a:spcAft>
-                <a:spcPts val="0"/>
-              </a:spcAft>
-              <a:buClr>
-                <a:srgbClr val="008080"/>
-              </a:buClr>
-              <a:buSzPct val="25000"/>
-              <a:buFont typeface="Courier New"/>
-              <a:buNone/>
-            </a:pPr>
-            <a:r>
-              <a:rPr lang="pl" sz="2600" b="1" i="0" u="none" strike="noStrike" cap="none" baseline="0">
-                <a:solidFill>
-                  <a:schemeClr val="accent4"/>
-                </a:solidFill>
-                <a:latin typeface="Courier"/>
-                <a:ea typeface="Courier"/>
-                <a:cs typeface="Courier"/>
-                <a:sym typeface="Courier New"/>
-              </a:rPr>
-              <a:t>00111001</a:t>
             </a:r>
           </a:p>
         </p:txBody>
@@ -15365,6 +15667,113 @@
                 <a:sym typeface="Cabin"/>
               </a:rPr>
               <a:t> dalej?</a:t>
+            </a:r>
+          </a:p>
+        </p:txBody>
+      </p:sp>
+      <p:sp>
+        <p:nvSpPr>
+          <p:cNvPr id="19" name="Shape 392">
+            <a:extLst>
+              <a:ext uri="{FF2B5EF4-FFF2-40B4-BE49-F238E27FC236}">
+                <a16:creationId xmlns:a16="http://schemas.microsoft.com/office/drawing/2014/main" id="{3B7A5509-02B2-49BD-A8BD-D7F01ADFD674}"/>
+              </a:ext>
+            </a:extLst>
+          </p:cNvPr>
+          <p:cNvSpPr/>
+          <p:nvPr/>
+        </p:nvSpPr>
+        <p:spPr>
+          <a:xfrm>
+            <a:off x="7489823" y="4031337"/>
+            <a:ext cx="3635372" cy="1473433"/>
+          </a:xfrm>
+          <a:prstGeom prst="wedgeEllipseCallout">
+            <a:avLst>
+              <a:gd name="adj1" fmla="val -17963"/>
+              <a:gd name="adj2" fmla="val 84303"/>
+            </a:avLst>
+          </a:prstGeom>
+          <a:solidFill>
+            <a:schemeClr val="tx1">
+              <a:lumMod val="75000"/>
+            </a:schemeClr>
+          </a:solidFill>
+          <a:ln w="50800" cap="rnd" cmpd="sng">
+            <a:solidFill>
+              <a:srgbClr val="FF9900"/>
+            </a:solidFill>
+            <a:prstDash val="solid"/>
+            <a:miter/>
+            <a:headEnd type="none" w="med" len="med"/>
+            <a:tailEnd type="none" w="med" len="med"/>
+          </a:ln>
+        </p:spPr>
+        <p:txBody>
+          <a:bodyPr lIns="0" tIns="0" rIns="0" bIns="0" anchor="ctr" anchorCtr="0">
+            <a:noAutofit/>
+          </a:bodyPr>
+          <a:lstStyle/>
+          <a:p>
+            <a:pPr marL="0" marR="0" lvl="0" indent="0" algn="ctr" rtl="0">
+              <a:lnSpc>
+                <a:spcPct val="100000"/>
+              </a:lnSpc>
+              <a:spcBef>
+                <a:spcPts val="0"/>
+              </a:spcBef>
+              <a:spcAft>
+                <a:spcPts val="0"/>
+              </a:spcAft>
+              <a:buClr>
+                <a:srgbClr val="008080"/>
+              </a:buClr>
+              <a:buSzPct val="25000"/>
+              <a:buFont typeface="Courier New"/>
+              <a:buNone/>
+            </a:pPr>
+            <a:r>
+              <a:rPr lang="pl" sz="2600" b="1" i="0" u="none" strike="noStrike" cap="none" baseline="0" dirty="0">
+                <a:solidFill>
+                  <a:schemeClr val="accent4"/>
+                </a:solidFill>
+                <a:latin typeface="Courier"/>
+                <a:ea typeface="Courier"/>
+                <a:cs typeface="Courier"/>
+                <a:sym typeface="Courier New"/>
+              </a:rPr>
+              <a:t>01001001</a:t>
+            </a:r>
+          </a:p>
+          <a:p>
+            <a:pPr marL="0" marR="0" lvl="0" indent="0" algn="ctr" rtl="0">
+              <a:lnSpc>
+                <a:spcPct val="100000"/>
+              </a:lnSpc>
+              <a:spcBef>
+                <a:spcPts val="0"/>
+              </a:spcBef>
+              <a:spcAft>
+                <a:spcPts val="0"/>
+              </a:spcAft>
+              <a:buClr>
+                <a:srgbClr val="008080"/>
+              </a:buClr>
+              <a:buSzPct val="25000"/>
+              <a:buFont typeface="Courier New"/>
+              <a:buNone/>
+            </a:pPr>
+            <a:r>
+              <a:rPr lang="pl" sz="2600" b="1" i="0" u="none" strike="noStrike" cap="none" baseline="0" dirty="0">
+                <a:solidFill>
+                  <a:schemeClr val="accent4"/>
+                </a:solidFill>
+                <a:latin typeface="Courier"/>
+                <a:ea typeface="Courier"/>
+                <a:cs typeface="Courier"/>
+                <a:sym typeface="Courier New"/>
+              </a:rPr>
+              <a:t>00111001</a:t>
             </a:r>
           </a:p>
         </p:txBody>
@@ -16776,7 +17185,31 @@
                 <a:cs typeface="Arial" charset="0"/>
                 <a:sym typeface="Cabin"/>
               </a:rPr>
-              <a:t>Kiedy popełniasz błędy, to komputer nie uważa że to </a:t>
+              <a:t>Kiedy popełniasz błędy, to komputer nie uważa</a:t>
+            </a:r>
+            <a:r>
+              <a:rPr lang="en-US" sz="3000" b="0" i="0" u="none" strike="noStrike" cap="none" baseline="0" dirty="0">
+                <a:solidFill>
+                  <a:schemeClr val="lt1"/>
+                </a:solidFill>
+                <a:latin typeface="Arial" charset="0"/>
+                <a:ea typeface="Arial" charset="0"/>
+                <a:cs typeface="Arial" charset="0"/>
+                <a:sym typeface="Cabin"/>
+              </a:rPr>
+              <a:t>,</a:t>
+            </a:r>
+            <a:r>
+              <a:rPr lang="pl" sz="3000" b="0" i="0" u="none" strike="noStrike" cap="none" baseline="0" dirty="0">
+                <a:solidFill>
+                  <a:schemeClr val="lt1"/>
+                </a:solidFill>
+                <a:latin typeface="Arial" charset="0"/>
+                <a:ea typeface="Arial" charset="0"/>
+                <a:cs typeface="Arial" charset="0"/>
+                <a:sym typeface="Cabin"/>
+              </a:rPr>
+              <a:t> że to </a:t>
             </a:r>
             <a:r>
               <a:rPr lang="pl" sz="3000" b="0" i="0" u="none" strike="noStrike" cap="none" baseline="0" dirty="0">
@@ -16999,6 +17432,18 @@
               <a:t>Więc </a:t>
             </a:r>
             <a:r>
+              <a:rPr lang="en-US" sz="3000" b="0" i="0" u="none" strike="noStrike" cap="none" baseline="0" dirty="0">
+                <a:solidFill>
+                  <a:srgbClr val="FFFF00"/>
+                </a:solidFill>
+                <a:latin typeface="Arial" charset="0"/>
+                <a:ea typeface="Arial" charset="0"/>
+                <a:cs typeface="Arial" charset="0"/>
+                <a:sym typeface="Cabin"/>
+              </a:rPr>
+              <a:t>T</a:t>
+            </a:r>
+            <a:r>
               <a:rPr lang="pl" sz="3000" b="0" i="0" u="none" strike="noStrike" cap="none" baseline="0" dirty="0">
                 <a:solidFill>
                   <a:srgbClr val="FFFF00"/>
@@ -17008,7 +17453,7 @@
                 <a:cs typeface="Arial" charset="0"/>
                 <a:sym typeface="Cabin"/>
               </a:rPr>
-              <a:t>tobie łatwiej będzie nauczyć się Pythona niż komputerowi polskiego</a:t>
+              <a:t>obie łatwiej będzie nauczyć się Pythona niż komputerowi polskiego</a:t>
             </a:r>
             <a:r>
               <a:rPr lang="pl" sz="3000" b="0" i="0" u="none" strike="noStrike" cap="none" baseline="0" dirty="0">
@@ -18124,7 +18569,7 @@
               </a:spcAft>
               <a:buNone/>
             </a:pPr>
-            <a:endParaRPr/>
+            <a:endParaRPr dirty="0"/>
           </a:p>
         </p:txBody>
       </p:sp>
@@ -18787,7 +19232,7 @@
               </a:spcAft>
               <a:buNone/>
             </a:pPr>
-            <a:endParaRPr/>
+            <a:endParaRPr dirty="0"/>
           </a:p>
         </p:txBody>
       </p:sp>
@@ -18898,7 +19343,7 @@
               </a:spcAft>
               <a:buNone/>
             </a:pPr>
-            <a:endParaRPr/>
+            <a:endParaRPr dirty="0"/>
           </a:p>
         </p:txBody>
       </p:sp>
@@ -19371,7 +19816,7 @@
               <a:buSzPct val="25000"/>
             </a:pPr>
             <a:r>
-              <a:rPr lang="pl" sz="2800" b="0" i="0" u="none" baseline="0">
+              <a:rPr lang="pl-PL" sz="2800" b="0" i="0" u="none" baseline="0" dirty="0">
                 <a:solidFill>
                   <a:srgbClr val="00FF00"/>
                 </a:solidFill>
@@ -19380,7 +19825,7 @@
                 <a:cs typeface="Courier"/>
                 <a:sym typeface="Courier New"/>
               </a:rPr>
-              <a:t>name = input('Nazwa pliku:')</a:t>
+              <a:t>name = input('Podaj nazwę pliku: ')</a:t>
             </a:r>
           </a:p>
           <a:p>
@@ -19391,7 +19836,7 @@
               <a:buSzPct val="25000"/>
             </a:pPr>
             <a:r>
-              <a:rPr lang="pl" sz="2800" b="0" i="0" u="none" baseline="0">
+              <a:rPr lang="pl-PL" sz="2800" b="0" i="0" u="none" baseline="0" dirty="0">
                 <a:solidFill>
                   <a:srgbClr val="00FF00"/>
                 </a:solidFill>
@@ -19400,11 +19845,25 @@
                 <a:cs typeface="Courier"/>
                 <a:sym typeface="Courier New"/>
               </a:rPr>
-              <a:t>handle = open(name)</a:t>
-            </a:r>
-          </a:p>
-          <a:p>
-            <a:pPr lvl="0" algn="ctr" rtl="0"/>
+              <a:t>handle = open(name, 'r')</a:t>
+            </a:r>
+            <a:endParaRPr lang="en-US" sz="2800" b="0" i="0" u="none" baseline="0" dirty="0">
+              <a:solidFill>
+                <a:srgbClr val="00FF00"/>
+              </a:solidFill>
+              <a:latin typeface="Courier"/>
+              <a:ea typeface="Courier"/>
+              <a:cs typeface="Courier"/>
+              <a:sym typeface="Courier New"/>
+            </a:endParaRPr>
+          </a:p>
+          <a:p>
+            <a:pPr lvl="0" algn="l" rtl="0">
+              <a:buClr>
+                <a:srgbClr val="00FF00"/>
+              </a:buClr>
+              <a:buSzPct val="25000"/>
+            </a:pPr>
             <a:endParaRPr lang="pl" sz="2800" dirty="0">
               <a:solidFill>
                 <a:srgbClr val="00FF00"/>
@@ -19423,7 +19882,7 @@
               <a:buSzPct val="25000"/>
             </a:pPr>
             <a:r>
-              <a:rPr lang="pl" sz="2800" b="0" i="0" u="none" baseline="0">
+              <a:rPr lang="pl" sz="2800" b="0" i="0" u="none" baseline="0" dirty="0">
                 <a:solidFill>
                   <a:srgbClr val="FF00FF"/>
                 </a:solidFill>
@@ -19443,7 +19902,7 @@
               <a:buSzPct val="25000"/>
             </a:pPr>
             <a:r>
-              <a:rPr lang="pl" sz="2800" b="0" i="0" u="none" baseline="0">
+              <a:rPr lang="en-US" sz="2800" b="0" i="0" u="none" baseline="0" dirty="0">
                 <a:solidFill>
                   <a:srgbClr val="FF00FF"/>
                 </a:solidFill>
@@ -19463,7 +19922,7 @@
               <a:buSzPct val="25000"/>
             </a:pPr>
             <a:r>
-              <a:rPr lang="pl" sz="2800" b="0" i="0" u="none" baseline="0">
+              <a:rPr lang="en-US" sz="2800" b="0" i="0" u="none" baseline="0" dirty="0">
                 <a:solidFill>
                   <a:srgbClr val="FF00FF"/>
                 </a:solidFill>
@@ -19472,18 +19931,10 @@
                 <a:cs typeface="Courier"/>
                 <a:sym typeface="Courier New"/>
               </a:rPr>
-              <a:t>    words = line.split()</a:t>
-            </a:r>
-          </a:p>
-          <a:p>
-            <a:pPr lvl="0" algn="l" rtl="0">
-              <a:buClr>
-                <a:srgbClr val="00FF00"/>
-              </a:buClr>
-              <a:buSzPct val="25000"/>
-            </a:pPr>
-            <a:r>
-              <a:rPr lang="pl" sz="2800" b="0" i="0" u="none" baseline="0">
+              <a:t>    line = </a:t>
+            </a:r>
+            <a:r>
+              <a:rPr lang="en-US" sz="2800" b="0" i="0" u="none" baseline="0" dirty="0" err="1">
                 <a:solidFill>
                   <a:srgbClr val="FF00FF"/>
                 </a:solidFill>
@@ -19492,18 +19943,10 @@
                 <a:cs typeface="Courier"/>
                 <a:sym typeface="Courier New"/>
               </a:rPr>
-              <a:t>    for word in words:</a:t>
-            </a:r>
-          </a:p>
-          <a:p>
-            <a:pPr lvl="0" algn="l" rtl="0">
-              <a:buClr>
-                <a:srgbClr val="00FF00"/>
-              </a:buClr>
-              <a:buSzPct val="25000"/>
-            </a:pPr>
-            <a:r>
-              <a:rPr lang="pl" sz="2800" b="0" i="0" u="none" baseline="0">
+              <a:t>line.lower</a:t>
+            </a:r>
+            <a:r>
+              <a:rPr lang="en-US" sz="2800" b="0" i="0" u="none" baseline="0" dirty="0">
                 <a:solidFill>
                   <a:srgbClr val="FF00FF"/>
                 </a:solidFill>
@@ -19512,7 +19955,7 @@
                 <a:cs typeface="Courier"/>
                 <a:sym typeface="Courier New"/>
               </a:rPr>
-              <a:t>        counts[word] = counts.get(word,0) + 1</a:t>
+              <a:t>()</a:t>
             </a:r>
           </a:p>
           <a:p>
@@ -19520,6 +19963,115 @@
               <a:buClr>
                 <a:srgbClr val="00FF00"/>
               </a:buClr>
+              <a:buSzPct val="25000"/>
+            </a:pPr>
+            <a:r>
+              <a:rPr lang="en-US" sz="2800" b="0" i="0" u="none" baseline="0" dirty="0">
+                <a:solidFill>
+                  <a:srgbClr val="FF00FF"/>
+                </a:solidFill>
+                <a:latin typeface="Courier"/>
+                <a:ea typeface="Courier"/>
+                <a:cs typeface="Courier"/>
+                <a:sym typeface="Courier New"/>
+              </a:rPr>
+              <a:t>    words = </a:t>
+            </a:r>
+            <a:r>
+              <a:rPr lang="en-US" sz="2800" b="0" i="0" u="none" baseline="0" dirty="0" err="1">
+                <a:solidFill>
+                  <a:srgbClr val="FF00FF"/>
+                </a:solidFill>
+                <a:latin typeface="Courier"/>
+                <a:ea typeface="Courier"/>
+                <a:cs typeface="Courier"/>
+                <a:sym typeface="Courier New"/>
+              </a:rPr>
+              <a:t>line.split</a:t>
+            </a:r>
+            <a:r>
+              <a:rPr lang="en-US" sz="2800" b="0" i="0" u="none" baseline="0" dirty="0">
+                <a:solidFill>
+                  <a:srgbClr val="FF00FF"/>
+                </a:solidFill>
+                <a:latin typeface="Courier"/>
+                <a:ea typeface="Courier"/>
+                <a:cs typeface="Courier"/>
+                <a:sym typeface="Courier New"/>
+              </a:rPr>
+              <a:t>()</a:t>
+            </a:r>
+          </a:p>
+          <a:p>
+            <a:pPr lvl="0" algn="l" rtl="0">
+              <a:buClr>
+                <a:srgbClr val="00FF00"/>
+              </a:buClr>
+              <a:buSzPct val="25000"/>
+            </a:pPr>
+            <a:r>
+              <a:rPr lang="en-US" sz="2800" b="0" i="0" u="none" baseline="0" dirty="0">
+                <a:solidFill>
+                  <a:srgbClr val="FF00FF"/>
+                </a:solidFill>
+                <a:latin typeface="Courier"/>
+                <a:ea typeface="Courier"/>
+                <a:cs typeface="Courier"/>
+                <a:sym typeface="Courier New"/>
+              </a:rPr>
+              <a:t>    for word in words:</a:t>
+            </a:r>
+          </a:p>
+          <a:p>
+            <a:pPr lvl="0" algn="l" rtl="0">
+              <a:buClr>
+                <a:srgbClr val="00FF00"/>
+              </a:buClr>
+              <a:buSzPct val="25000"/>
+            </a:pPr>
+            <a:r>
+              <a:rPr lang="en-US" sz="2800" b="0" i="0" u="none" baseline="0" dirty="0">
+                <a:solidFill>
+                  <a:srgbClr val="FF00FF"/>
+                </a:solidFill>
+                <a:latin typeface="Courier"/>
+                <a:ea typeface="Courier"/>
+                <a:cs typeface="Courier"/>
+                <a:sym typeface="Courier New"/>
+              </a:rPr>
+              <a:t>        counts[word] = </a:t>
+            </a:r>
+            <a:r>
+              <a:rPr lang="en-US" sz="2800" b="0" i="0" u="none" baseline="0" dirty="0" err="1">
+                <a:solidFill>
+                  <a:srgbClr val="FF00FF"/>
+                </a:solidFill>
+                <a:latin typeface="Courier"/>
+                <a:ea typeface="Courier"/>
+                <a:cs typeface="Courier"/>
+                <a:sym typeface="Courier New"/>
+              </a:rPr>
+              <a:t>counts.get</a:t>
+            </a:r>
+            <a:r>
+              <a:rPr lang="en-US" sz="2800" b="0" i="0" u="none" baseline="0" dirty="0">
+                <a:solidFill>
+                  <a:srgbClr val="FF00FF"/>
+                </a:solidFill>
+                <a:latin typeface="Courier"/>
+                <a:ea typeface="Courier"/>
+                <a:cs typeface="Courier"/>
+                <a:sym typeface="Courier New"/>
+              </a:rPr>
+              <a:t>(word, 0) + 1</a:t>
+            </a:r>
+          </a:p>
+          <a:p>
+            <a:pPr lvl="0" algn="l" rtl="0">
+              <a:buClr>
+                <a:srgbClr val="00FF00"/>
+              </a:buClr>
+              <a:buSzPct val="25000"/>
             </a:pPr>
             <a:endParaRPr lang="pl" sz="2800" dirty="0">
               <a:solidFill>
@@ -19539,7 +20091,7 @@
               <a:buSzPct val="25000"/>
             </a:pPr>
             <a:r>
-              <a:rPr lang="pl" sz="2800" b="0" i="0" u="none" baseline="0">
+              <a:rPr lang="en-US" sz="2800" b="0" i="0" u="none" baseline="0" dirty="0" err="1">
                 <a:solidFill>
                   <a:srgbClr val="00FFFF"/>
                 </a:solidFill>
@@ -19548,18 +20100,10 @@
                 <a:cs typeface="Courier"/>
                 <a:sym typeface="Courier New"/>
               </a:rPr>
-              <a:t>bigcount = None</a:t>
-            </a:r>
-          </a:p>
-          <a:p>
-            <a:pPr lvl="0" algn="l" rtl="0">
-              <a:buClr>
-                <a:srgbClr val="00FF00"/>
-              </a:buClr>
-              <a:buSzPct val="25000"/>
-            </a:pPr>
-            <a:r>
-              <a:rPr lang="pl" sz="2800" b="0" i="0" u="none" baseline="0">
+              <a:t>bigcount</a:t>
+            </a:r>
+            <a:r>
+              <a:rPr lang="en-US" sz="2800" b="0" i="0" u="none" baseline="0" dirty="0">
                 <a:solidFill>
                   <a:srgbClr val="00FFFF"/>
                 </a:solidFill>
@@ -19568,7 +20112,7 @@
                 <a:cs typeface="Courier"/>
                 <a:sym typeface="Courier New"/>
               </a:rPr>
-              <a:t>bigword = None</a:t>
+              <a:t> = None</a:t>
             </a:r>
           </a:p>
           <a:p>
@@ -19579,7 +20123,7 @@
               <a:buSzPct val="25000"/>
             </a:pPr>
             <a:r>
-              <a:rPr lang="pl" sz="2800" b="0" i="0" u="none" baseline="0">
+              <a:rPr lang="en-US" sz="2800" b="0" i="0" u="none" baseline="0" dirty="0" err="1">
                 <a:solidFill>
                   <a:srgbClr val="00FFFF"/>
                 </a:solidFill>
@@ -19588,18 +20132,10 @@
                 <a:cs typeface="Courier"/>
                 <a:sym typeface="Courier New"/>
               </a:rPr>
-              <a:t>for word,count in counts.items():</a:t>
-            </a:r>
-          </a:p>
-          <a:p>
-            <a:pPr lvl="0" algn="l" rtl="0">
-              <a:buClr>
-                <a:srgbClr val="00FF00"/>
-              </a:buClr>
-              <a:buSzPct val="25000"/>
-            </a:pPr>
-            <a:r>
-              <a:rPr lang="pl" sz="2800" b="0" i="0" u="none" baseline="0">
+              <a:t>bigword</a:t>
+            </a:r>
+            <a:r>
+              <a:rPr lang="en-US" sz="2800" b="0" i="0" u="none" baseline="0" dirty="0">
                 <a:solidFill>
                   <a:srgbClr val="00FFFF"/>
                 </a:solidFill>
@@ -19608,7 +20144,7 @@
                 <a:cs typeface="Courier"/>
                 <a:sym typeface="Courier New"/>
               </a:rPr>
-              <a:t>    if bigcount is None or count &gt; bigcount:</a:t>
+              <a:t> = None</a:t>
             </a:r>
           </a:p>
           <a:p>
@@ -19619,7 +20155,7 @@
               <a:buSzPct val="25000"/>
             </a:pPr>
             <a:r>
-              <a:rPr lang="pl" sz="2800" b="0" i="0" u="none" baseline="0">
+              <a:rPr lang="en-US" sz="2800" b="0" i="0" u="none" baseline="0" dirty="0">
                 <a:solidFill>
                   <a:srgbClr val="00FFFF"/>
                 </a:solidFill>
@@ -19628,18 +20164,10 @@
                 <a:cs typeface="Courier"/>
                 <a:sym typeface="Courier New"/>
               </a:rPr>
-              <a:t>        bigword = None</a:t>
-            </a:r>
-          </a:p>
-          <a:p>
-            <a:pPr lvl="0" algn="l" rtl="0">
-              <a:buClr>
-                <a:srgbClr val="00FF00"/>
-              </a:buClr>
-              <a:buSzPct val="25000"/>
-            </a:pPr>
-            <a:r>
-              <a:rPr lang="pl" sz="2800" b="0" i="0" u="none" baseline="0">
+              <a:t>for word, count in list(</a:t>
+            </a:r>
+            <a:r>
+              <a:rPr lang="en-US" sz="2800" b="0" i="0" u="none" baseline="0" dirty="0" err="1">
                 <a:solidFill>
                   <a:srgbClr val="00FFFF"/>
                 </a:solidFill>
@@ -19648,7 +20176,19 @@
                 <a:cs typeface="Courier"/>
                 <a:sym typeface="Courier New"/>
               </a:rPr>
-              <a:t>        bigcount = count</a:t>
+              <a:t>counts.items</a:t>
+            </a:r>
+            <a:r>
+              <a:rPr lang="en-US" sz="2800" b="0" i="0" u="none" baseline="0" dirty="0">
+                <a:solidFill>
+                  <a:srgbClr val="00FFFF"/>
+                </a:solidFill>
+                <a:latin typeface="Courier"/>
+                <a:ea typeface="Courier"/>
+                <a:cs typeface="Courier"/>
+                <a:sym typeface="Courier New"/>
+              </a:rPr>
+              <a:t>()):</a:t>
             </a:r>
           </a:p>
           <a:p>
@@ -19656,6 +20196,163 @@
               <a:buClr>
                 <a:srgbClr val="00FF00"/>
               </a:buClr>
+              <a:buSzPct val="25000"/>
+            </a:pPr>
+            <a:r>
+              <a:rPr lang="en-US" sz="2800" b="0" i="0" u="none" baseline="0" dirty="0">
+                <a:solidFill>
+                  <a:srgbClr val="00FFFF"/>
+                </a:solidFill>
+                <a:latin typeface="Courier"/>
+                <a:ea typeface="Courier"/>
+                <a:cs typeface="Courier"/>
+                <a:sym typeface="Courier New"/>
+              </a:rPr>
+              <a:t>    if </a:t>
+            </a:r>
+            <a:r>
+              <a:rPr lang="en-US" sz="2800" b="0" i="0" u="none" baseline="0" dirty="0" err="1">
+                <a:solidFill>
+                  <a:srgbClr val="00FFFF"/>
+                </a:solidFill>
+                <a:latin typeface="Courier"/>
+                <a:ea typeface="Courier"/>
+                <a:cs typeface="Courier"/>
+                <a:sym typeface="Courier New"/>
+              </a:rPr>
+              <a:t>bigcount</a:t>
+            </a:r>
+            <a:r>
+              <a:rPr lang="en-US" sz="2800" b="0" i="0" u="none" baseline="0" dirty="0">
+                <a:solidFill>
+                  <a:srgbClr val="00FFFF"/>
+                </a:solidFill>
+                <a:latin typeface="Courier"/>
+                <a:ea typeface="Courier"/>
+                <a:cs typeface="Courier"/>
+                <a:sym typeface="Courier New"/>
+              </a:rPr>
+              <a:t> is None or count &gt; </a:t>
+            </a:r>
+            <a:r>
+              <a:rPr lang="en-US" sz="2800" b="0" i="0" u="none" baseline="0" dirty="0" err="1">
+                <a:solidFill>
+                  <a:srgbClr val="00FFFF"/>
+                </a:solidFill>
+                <a:latin typeface="Courier"/>
+                <a:ea typeface="Courier"/>
+                <a:cs typeface="Courier"/>
+                <a:sym typeface="Courier New"/>
+              </a:rPr>
+              <a:t>bigcount</a:t>
+            </a:r>
+            <a:r>
+              <a:rPr lang="en-US" sz="2800" b="0" i="0" u="none" baseline="0" dirty="0">
+                <a:solidFill>
+                  <a:srgbClr val="00FFFF"/>
+                </a:solidFill>
+                <a:latin typeface="Courier"/>
+                <a:ea typeface="Courier"/>
+                <a:cs typeface="Courier"/>
+                <a:sym typeface="Courier New"/>
+              </a:rPr>
+              <a:t>:</a:t>
+            </a:r>
+          </a:p>
+          <a:p>
+            <a:pPr lvl="0" algn="l" rtl="0">
+              <a:buClr>
+                <a:srgbClr val="00FF00"/>
+              </a:buClr>
+              <a:buSzPct val="25000"/>
+            </a:pPr>
+            <a:r>
+              <a:rPr lang="en-US" sz="2800" b="0" i="0" u="none" baseline="0" dirty="0">
+                <a:solidFill>
+                  <a:srgbClr val="00FFFF"/>
+                </a:solidFill>
+                <a:latin typeface="Courier"/>
+                <a:ea typeface="Courier"/>
+                <a:cs typeface="Courier"/>
+                <a:sym typeface="Courier New"/>
+              </a:rPr>
+              <a:t>        </a:t>
+            </a:r>
+            <a:r>
+              <a:rPr lang="en-US" sz="2800" b="0" i="0" u="none" baseline="0" dirty="0" err="1">
+                <a:solidFill>
+                  <a:srgbClr val="00FFFF"/>
+                </a:solidFill>
+                <a:latin typeface="Courier"/>
+                <a:ea typeface="Courier"/>
+                <a:cs typeface="Courier"/>
+                <a:sym typeface="Courier New"/>
+              </a:rPr>
+              <a:t>bigword</a:t>
+            </a:r>
+            <a:r>
+              <a:rPr lang="en-US" sz="2800" b="0" i="0" u="none" baseline="0" dirty="0">
+                <a:solidFill>
+                  <a:srgbClr val="00FFFF"/>
+                </a:solidFill>
+                <a:latin typeface="Courier"/>
+                <a:ea typeface="Courier"/>
+                <a:cs typeface="Courier"/>
+                <a:sym typeface="Courier New"/>
+              </a:rPr>
+              <a:t> = word</a:t>
+            </a:r>
+          </a:p>
+          <a:p>
+            <a:pPr lvl="0" algn="l" rtl="0">
+              <a:buClr>
+                <a:srgbClr val="00FF00"/>
+              </a:buClr>
+              <a:buSzPct val="25000"/>
+            </a:pPr>
+            <a:r>
+              <a:rPr lang="en-US" sz="2800" b="0" i="0" u="none" baseline="0" dirty="0">
+                <a:solidFill>
+                  <a:srgbClr val="00FFFF"/>
+                </a:solidFill>
+                <a:latin typeface="Courier"/>
+                <a:ea typeface="Courier"/>
+                <a:cs typeface="Courier"/>
+                <a:sym typeface="Courier New"/>
+              </a:rPr>
+              <a:t>        </a:t>
+            </a:r>
+            <a:r>
+              <a:rPr lang="en-US" sz="2800" b="0" i="0" u="none" baseline="0" dirty="0" err="1">
+                <a:solidFill>
+                  <a:srgbClr val="00FFFF"/>
+                </a:solidFill>
+                <a:latin typeface="Courier"/>
+                <a:ea typeface="Courier"/>
+                <a:cs typeface="Courier"/>
+                <a:sym typeface="Courier New"/>
+              </a:rPr>
+              <a:t>bigcount</a:t>
+            </a:r>
+            <a:r>
+              <a:rPr lang="en-US" sz="2800" b="0" i="0" u="none" baseline="0" dirty="0">
+                <a:solidFill>
+                  <a:srgbClr val="00FFFF"/>
+                </a:solidFill>
+                <a:latin typeface="Courier"/>
+                <a:ea typeface="Courier"/>
+                <a:cs typeface="Courier"/>
+                <a:sym typeface="Courier New"/>
+              </a:rPr>
+              <a:t> = count</a:t>
+            </a:r>
+          </a:p>
+          <a:p>
+            <a:pPr lvl="0" algn="l" rtl="0">
+              <a:buClr>
+                <a:srgbClr val="00FF00"/>
+              </a:buClr>
+              <a:buSzPct val="25000"/>
             </a:pPr>
             <a:endParaRPr lang="pl" sz="2800" dirty="0">
               <a:solidFill>
@@ -19675,7 +20372,7 @@
               <a:buSzPct val="25000"/>
             </a:pPr>
             <a:r>
-              <a:rPr lang="pl" sz="2800" b="0" i="0" u="none" baseline="0">
+              <a:rPr lang="pl" sz="2800" b="0" i="0" u="none" baseline="0" dirty="0">
                 <a:solidFill>
                   <a:srgbClr val="FF7F00"/>
                 </a:solidFill>
@@ -19738,7 +20435,7 @@
               <a:buNone/>
             </a:pPr>
             <a:r>
-              <a:rPr lang="pl" sz="3600" b="0" i="0" u="none" baseline="0">
+              <a:rPr lang="pl" sz="2800" b="0" i="0" u="none" baseline="0" dirty="0">
                 <a:solidFill>
                   <a:srgbClr val="FFFF00"/>
                 </a:solidFill>
@@ -19750,7 +20447,7 @@
               <a:t> </a:t>
             </a:r>
             <a:r>
-              <a:rPr lang="pl" sz="3600" b="0" i="0" u="none" strike="noStrike" cap="none" baseline="0">
+              <a:rPr lang="pl" sz="2800" b="0" i="0" u="none" strike="noStrike" cap="none" baseline="0" dirty="0">
                 <a:solidFill>
                   <a:srgbClr val="FFFF00"/>
                 </a:solidFill>
@@ -19759,7 +20456,31 @@
                 <a:cs typeface="Arial" charset="0"/>
                 <a:sym typeface="Cabin"/>
               </a:rPr>
-              <a:t>python words.py </a:t>
+              <a:t>python</a:t>
+            </a:r>
+            <a:r>
+              <a:rPr lang="en-US" sz="2800" b="0" i="0" u="none" strike="noStrike" cap="none" baseline="0" dirty="0">
+                <a:solidFill>
+                  <a:srgbClr val="FFFF00"/>
+                </a:solidFill>
+                <a:latin typeface="Arial" charset="0"/>
+                <a:ea typeface="Arial" charset="0"/>
+                <a:cs typeface="Arial" charset="0"/>
+                <a:sym typeface="Cabin"/>
+              </a:rPr>
+              <a:t>3</a:t>
+            </a:r>
+            <a:r>
+              <a:rPr lang="pl" sz="2800" b="0" i="0" u="none" strike="noStrike" cap="none" baseline="0" dirty="0">
+                <a:solidFill>
+                  <a:srgbClr val="FFFF00"/>
+                </a:solidFill>
+                <a:latin typeface="Arial" charset="0"/>
+                <a:ea typeface="Arial" charset="0"/>
+                <a:cs typeface="Arial" charset="0"/>
+                <a:sym typeface="Cabin"/>
+              </a:rPr>
+              <a:t> words.py </a:t>
             </a:r>
           </a:p>
           <a:p>
@@ -19781,7 +20502,7 @@
               <a:buNone/>
             </a:pPr>
             <a:r>
-              <a:rPr lang="pl" sz="3600" b="0" i="0" u="none" baseline="0">
+              <a:rPr lang="pl" sz="2800" b="0" i="0" u="none" baseline="0" dirty="0">
                 <a:solidFill>
                   <a:srgbClr val="FFFF00"/>
                 </a:solidFill>
@@ -19790,7 +20511,43 @@
                 <a:cs typeface="Arial" charset="0"/>
                 <a:sym typeface="Cabin"/>
               </a:rPr>
-              <a:t> Nazwa pliku: words.txt</a:t>
+              <a:t> </a:t>
+            </a:r>
+            <a:r>
+              <a:rPr lang="pl-PL" sz="2800" b="0" i="0" u="none" strike="noStrike" cap="none" baseline="0" dirty="0">
+                <a:solidFill>
+                  <a:srgbClr val="FFFF00"/>
+                </a:solidFill>
+                <a:latin typeface="Arial" charset="0"/>
+                <a:ea typeface="Arial" charset="0"/>
+                <a:cs typeface="Arial" charset="0"/>
+                <a:sym typeface="Cabin"/>
+              </a:rPr>
+              <a:t>Podaj nazwę pliku</a:t>
+            </a:r>
+            <a:r>
+              <a:rPr lang="pl" sz="2800" b="0" i="0" u="none" strike="noStrike" cap="none" baseline="0" dirty="0">
+                <a:solidFill>
+                  <a:srgbClr val="FFFF00"/>
+                </a:solidFill>
+                <a:latin typeface="Arial" charset="0"/>
+                <a:ea typeface="Arial" charset="0"/>
+                <a:cs typeface="Arial" charset="0"/>
+                <a:sym typeface="Cabin"/>
+              </a:rPr>
+              <a:t>: </a:t>
+            </a:r>
+            <a:r>
+              <a:rPr lang="pl" sz="2800" b="0" i="0" u="none" strike="noStrike" cap="none" baseline="0" dirty="0">
+                <a:solidFill>
+                  <a:schemeClr val="lt1"/>
+                </a:solidFill>
+                <a:latin typeface="Arial" charset="0"/>
+                <a:ea typeface="Arial" charset="0"/>
+                <a:cs typeface="Arial" charset="0"/>
+                <a:sym typeface="Cabin"/>
+              </a:rPr>
+              <a:t>words.txt</a:t>
             </a:r>
           </a:p>
           <a:p>
@@ -19812,7 +20569,7 @@
               <a:buNone/>
             </a:pPr>
             <a:r>
-              <a:rPr lang="pl" sz="3600" b="0" i="0" u="none" baseline="0">
+              <a:rPr lang="pl" sz="2800" b="0" i="0" u="none" baseline="0" dirty="0">
                 <a:solidFill>
                   <a:srgbClr val="FFFF00"/>
                 </a:solidFill>
@@ -19824,7 +20581,7 @@
               <a:t> </a:t>
             </a:r>
             <a:r>
-              <a:rPr lang="pl" sz="3600" b="0" i="0" u="none" strike="noStrike" cap="none" baseline="0">
+              <a:rPr lang="en-US" sz="2800" dirty="0">
                 <a:solidFill>
                   <a:srgbClr val="FFFF00"/>
                 </a:solidFill>
@@ -19833,8 +20590,17 @@
                 <a:cs typeface="Arial" charset="0"/>
                 <a:sym typeface="Cabin"/>
               </a:rPr>
-              <a:t>to 16</a:t>
-            </a:r>
+              <a:t>w 5</a:t>
+            </a:r>
+            <a:endParaRPr lang="pl" sz="2800" b="0" i="0" u="none" strike="noStrike" cap="none" baseline="0" dirty="0">
+              <a:solidFill>
+                <a:srgbClr val="FFFF00"/>
+              </a:solidFill>
+              <a:latin typeface="Arial" charset="0"/>
+              <a:ea typeface="Arial" charset="0"/>
+              <a:cs typeface="Arial" charset="0"/>
+              <a:sym typeface="Cabin"/>
+            </a:endParaRPr>
           </a:p>
         </p:txBody>
       </p:sp>
@@ -25061,7 +25827,7 @@
               </a:spcBef>
               <a:buNone/>
             </a:pPr>
-            <a:endParaRPr/>
+            <a:endParaRPr dirty="0"/>
           </a:p>
         </p:txBody>
       </p:sp>
@@ -26958,7 +27724,7 @@
               <a:buSzPct val="25000"/>
             </a:pPr>
             <a:r>
-              <a:rPr lang="pl" sz="2800" b="0" i="0" u="none" baseline="0">
+              <a:rPr lang="pl" sz="2800" b="0" i="0" u="none" baseline="0" dirty="0">
                 <a:solidFill>
                   <a:srgbClr val="FFFF00"/>
                 </a:solidFill>
@@ -26970,7 +27736,7 @@
               <a:t>name = </a:t>
             </a:r>
             <a:r>
-              <a:rPr lang="pl" sz="2800" b="0" i="0" u="none" baseline="0">
+              <a:rPr lang="pl" sz="2800" b="0" i="0" u="none" baseline="0" dirty="0">
                 <a:solidFill>
                   <a:schemeClr val="bg1"/>
                 </a:solidFill>
@@ -26982,7 +27748,7 @@
               <a:t>input</a:t>
             </a:r>
             <a:r>
-              <a:rPr lang="pl" sz="2800" b="0" i="0" u="none" baseline="0">
+              <a:rPr lang="pl" sz="2800" b="0" i="0" u="none" baseline="0" dirty="0">
                 <a:solidFill>
                   <a:srgbClr val="FFFF00"/>
                 </a:solidFill>
@@ -26991,18 +27757,10 @@
                 <a:cs typeface="Courier"/>
                 <a:sym typeface="Courier New"/>
               </a:rPr>
-              <a:t>('Nazwa pliku:')</a:t>
-            </a:r>
-          </a:p>
-          <a:p>
-            <a:pPr lvl="0" algn="l" rtl="0">
-              <a:buClr>
-                <a:srgbClr val="00FF00"/>
-              </a:buClr>
-              <a:buSzPct val="25000"/>
-            </a:pPr>
-            <a:r>
-              <a:rPr lang="pl" sz="2800" b="0" i="0" u="none" baseline="0">
+              <a:t>('</a:t>
+            </a:r>
+            <a:r>
+              <a:rPr lang="pl-PL" sz="2800" b="0" i="0" u="none" baseline="0" dirty="0">
                 <a:solidFill>
                   <a:srgbClr val="FFFF00"/>
                 </a:solidFill>
@@ -27011,9 +27769,65 @@
                 <a:cs typeface="Courier"/>
                 <a:sym typeface="Courier New"/>
               </a:rPr>
-              <a:t>handle = open(name)</a:t>
-            </a:r>
-            <a:endParaRPr lang="pl" sz="2800" dirty="0">
+              <a:t>Podaj nazwę pliku: </a:t>
+            </a:r>
+            <a:r>
+              <a:rPr lang="pl" sz="2800" b="0" i="0" u="none" baseline="0" dirty="0">
+                <a:solidFill>
+                  <a:srgbClr val="FFFF00"/>
+                </a:solidFill>
+                <a:latin typeface="Courier"/>
+                <a:ea typeface="Courier"/>
+                <a:cs typeface="Courier"/>
+                <a:sym typeface="Courier New"/>
+              </a:rPr>
+              <a:t>')</a:t>
+            </a:r>
+          </a:p>
+          <a:p>
+            <a:pPr lvl="0" algn="l" rtl="0">
+              <a:buClr>
+                <a:srgbClr val="00FF00"/>
+              </a:buClr>
+              <a:buSzPct val="25000"/>
+            </a:pPr>
+            <a:r>
+              <a:rPr lang="pl" sz="2800" b="0" i="0" u="none" baseline="0" dirty="0">
+                <a:solidFill>
+                  <a:srgbClr val="FFFF00"/>
+                </a:solidFill>
+                <a:latin typeface="Courier"/>
+                <a:ea typeface="Courier"/>
+                <a:cs typeface="Courier"/>
+                <a:sym typeface="Courier New"/>
+              </a:rPr>
+              <a:t>handle = open(name</a:t>
+            </a:r>
+            <a:r>
+              <a:rPr lang="pl-PL" sz="2800" b="0" i="0" u="none" baseline="0" dirty="0">
+                <a:solidFill>
+                  <a:srgbClr val="FFFF00"/>
+                </a:solidFill>
+                <a:latin typeface="Courier"/>
+                <a:ea typeface="Courier"/>
+                <a:cs typeface="Courier"/>
+                <a:sym typeface="Courier New"/>
+              </a:rPr>
+              <a:t>, 'r'</a:t>
+            </a:r>
+            <a:r>
+              <a:rPr lang="pl" sz="2800" b="0" i="0" u="none" baseline="0" dirty="0">
+                <a:solidFill>
+                  <a:srgbClr val="FFFF00"/>
+                </a:solidFill>
+                <a:latin typeface="Courier"/>
+                <a:ea typeface="Courier"/>
+                <a:cs typeface="Courier"/>
+                <a:sym typeface="Courier New"/>
+              </a:rPr>
+              <a:t>)</a:t>
+            </a:r>
+            <a:endParaRPr lang="en-US" sz="2800" b="0" i="0" u="none" baseline="0" dirty="0">
               <a:solidFill>
                 <a:srgbClr val="FFFF00"/>
               </a:solidFill>
@@ -27024,7 +27838,223 @@
             </a:endParaRPr>
           </a:p>
           <a:p>
-            <a:pPr lvl="0" algn="ctr" rtl="0"/>
+            <a:pPr lvl="0" algn="l" rtl="0">
+              <a:buClr>
+                <a:srgbClr val="00FF00"/>
+              </a:buClr>
+              <a:buSzPct val="25000"/>
+            </a:pPr>
+            <a:r>
+              <a:rPr lang="pl" sz="2800" b="0" i="0" u="none" baseline="0" dirty="0">
+                <a:solidFill>
+                  <a:srgbClr val="FFFF00"/>
+                </a:solidFill>
+                <a:latin typeface="Courier"/>
+                <a:ea typeface="Courier"/>
+                <a:cs typeface="Courier"/>
+                <a:sym typeface="Courier New"/>
+              </a:rPr>
+              <a:t>counts = dict()</a:t>
+            </a:r>
+            <a:endParaRPr lang="en-US" sz="2800" b="0" i="0" u="none" baseline="0" dirty="0">
+              <a:solidFill>
+                <a:srgbClr val="FFFF00"/>
+              </a:solidFill>
+              <a:latin typeface="Courier"/>
+              <a:ea typeface="Courier"/>
+              <a:cs typeface="Courier"/>
+              <a:sym typeface="Courier New"/>
+            </a:endParaRPr>
+          </a:p>
+          <a:p>
+            <a:pPr lvl="0" algn="l" rtl="0">
+              <a:buClr>
+                <a:srgbClr val="00FF00"/>
+              </a:buClr>
+              <a:buSzPct val="25000"/>
+            </a:pPr>
+            <a:endParaRPr lang="pl" sz="2800" b="0" i="0" u="none" baseline="0" dirty="0">
+              <a:solidFill>
+                <a:srgbClr val="FFFF00"/>
+              </a:solidFill>
+              <a:latin typeface="Courier"/>
+              <a:ea typeface="Courier"/>
+              <a:cs typeface="Courier"/>
+              <a:sym typeface="Courier New"/>
+            </a:endParaRPr>
+          </a:p>
+          <a:p>
+            <a:pPr lvl="0" algn="l" rtl="0">
+              <a:buClr>
+                <a:srgbClr val="00FF00"/>
+              </a:buClr>
+              <a:buSzPct val="25000"/>
+            </a:pPr>
+            <a:r>
+              <a:rPr lang="pl" sz="2800" b="0" i="0" u="none" baseline="0" dirty="0">
+                <a:solidFill>
+                  <a:srgbClr val="00FA00"/>
+                </a:solidFill>
+                <a:latin typeface="Courier"/>
+                <a:ea typeface="Courier"/>
+                <a:cs typeface="Courier"/>
+                <a:sym typeface="Courier New"/>
+              </a:rPr>
+              <a:t>for line in handle:</a:t>
+            </a:r>
+            <a:endParaRPr lang="en-US" sz="2800" b="0" i="0" u="none" baseline="0" dirty="0">
+              <a:solidFill>
+                <a:srgbClr val="00FA00"/>
+              </a:solidFill>
+              <a:latin typeface="Courier"/>
+              <a:ea typeface="Courier"/>
+              <a:cs typeface="Courier"/>
+              <a:sym typeface="Courier New"/>
+            </a:endParaRPr>
+          </a:p>
+          <a:p>
+            <a:pPr lvl="0" algn="l" rtl="0">
+              <a:buClr>
+                <a:srgbClr val="00FF00"/>
+              </a:buClr>
+              <a:buSzPct val="25000"/>
+            </a:pPr>
+            <a:r>
+              <a:rPr lang="en-US" sz="2800" dirty="0">
+                <a:solidFill>
+                  <a:srgbClr val="00FA00"/>
+                </a:solidFill>
+                <a:latin typeface="Courier"/>
+                <a:ea typeface="Courier"/>
+                <a:cs typeface="Courier"/>
+                <a:sym typeface="Courier New"/>
+              </a:rPr>
+              <a:t>    line = </a:t>
+            </a:r>
+            <a:r>
+              <a:rPr lang="en-US" sz="2800" dirty="0" err="1">
+                <a:solidFill>
+                  <a:srgbClr val="00FA00"/>
+                </a:solidFill>
+                <a:latin typeface="Courier"/>
+                <a:ea typeface="Courier"/>
+                <a:cs typeface="Courier"/>
+                <a:sym typeface="Courier New"/>
+              </a:rPr>
+              <a:t>line.lower</a:t>
+            </a:r>
+            <a:r>
+              <a:rPr lang="en-US" sz="2800" dirty="0">
+                <a:solidFill>
+                  <a:srgbClr val="00FA00"/>
+                </a:solidFill>
+                <a:latin typeface="Courier"/>
+                <a:ea typeface="Courier"/>
+                <a:cs typeface="Courier"/>
+                <a:sym typeface="Courier New"/>
+              </a:rPr>
+              <a:t>()</a:t>
+            </a:r>
+            <a:endParaRPr lang="pl" sz="2800" b="0" i="0" u="none" baseline="0" dirty="0">
+              <a:solidFill>
+                <a:srgbClr val="00FA00"/>
+              </a:solidFill>
+              <a:latin typeface="Courier"/>
+              <a:ea typeface="Courier"/>
+              <a:cs typeface="Courier"/>
+              <a:sym typeface="Courier New"/>
+            </a:endParaRPr>
+          </a:p>
+          <a:p>
+            <a:pPr lvl="0" algn="l" rtl="0">
+              <a:buClr>
+                <a:srgbClr val="00FF00"/>
+              </a:buClr>
+              <a:buSzPct val="25000"/>
+            </a:pPr>
+            <a:r>
+              <a:rPr lang="pl" sz="2800" b="0" i="0" u="none" baseline="0" dirty="0">
+                <a:solidFill>
+                  <a:srgbClr val="00FA00"/>
+                </a:solidFill>
+                <a:latin typeface="Courier"/>
+                <a:ea typeface="Courier"/>
+                <a:cs typeface="Courier"/>
+                <a:sym typeface="Courier New"/>
+              </a:rPr>
+              <a:t>    words = line.split()</a:t>
+            </a:r>
+          </a:p>
+          <a:p>
+            <a:pPr lvl="0" algn="l" rtl="0">
+              <a:buClr>
+                <a:srgbClr val="00FF00"/>
+              </a:buClr>
+              <a:buSzPct val="25000"/>
+            </a:pPr>
+            <a:r>
+              <a:rPr lang="pl" sz="2800" b="0" i="0" u="none" baseline="0" dirty="0">
+                <a:solidFill>
+                  <a:srgbClr val="00FA00"/>
+                </a:solidFill>
+                <a:latin typeface="Courier"/>
+                <a:ea typeface="Courier"/>
+                <a:cs typeface="Courier"/>
+                <a:sym typeface="Courier New"/>
+              </a:rPr>
+              <a:t>    for word in words:</a:t>
+            </a:r>
+          </a:p>
+          <a:p>
+            <a:pPr lvl="0" algn="l" rtl="0">
+              <a:buClr>
+                <a:srgbClr val="00FF00"/>
+              </a:buClr>
+              <a:buSzPct val="25000"/>
+            </a:pPr>
+            <a:r>
+              <a:rPr lang="pl" sz="2800" b="0" i="0" u="none" baseline="0" dirty="0">
+                <a:solidFill>
+                  <a:srgbClr val="00FA00"/>
+                </a:solidFill>
+                <a:latin typeface="Courier"/>
+                <a:ea typeface="Courier"/>
+                <a:cs typeface="Courier"/>
+                <a:sym typeface="Courier New"/>
+              </a:rPr>
+              <a:t>        counts[word] = counts.get(word,</a:t>
+            </a:r>
+            <a:r>
+              <a:rPr lang="en-US" sz="2800" b="0" i="0" u="none" baseline="0" dirty="0">
+                <a:solidFill>
+                  <a:srgbClr val="00FA00"/>
+                </a:solidFill>
+                <a:latin typeface="Courier"/>
+                <a:ea typeface="Courier"/>
+                <a:cs typeface="Courier"/>
+                <a:sym typeface="Courier New"/>
+              </a:rPr>
+              <a:t> </a:t>
+            </a:r>
+            <a:r>
+              <a:rPr lang="pl" sz="2800" b="0" i="0" u="none" baseline="0" dirty="0">
+                <a:solidFill>
+                  <a:srgbClr val="00FA00"/>
+                </a:solidFill>
+                <a:latin typeface="Courier"/>
+                <a:ea typeface="Courier"/>
+                <a:cs typeface="Courier"/>
+                <a:sym typeface="Courier New"/>
+              </a:rPr>
+              <a:t>0) + 1</a:t>
+            </a:r>
+          </a:p>
+          <a:p>
+            <a:pPr lvl="0" algn="l" rtl="0">
+              <a:buClr>
+                <a:srgbClr val="00FF00"/>
+              </a:buClr>
+            </a:pPr>
             <a:endParaRPr lang="pl" sz="2800" dirty="0">
               <a:solidFill>
                 <a:srgbClr val="00FF00"/>
@@ -27043,7 +28073,7 @@
               <a:buSzPct val="25000"/>
             </a:pPr>
             <a:r>
-              <a:rPr lang="pl" sz="2800" b="0" i="0" u="none" baseline="0">
+              <a:rPr lang="pl" sz="2800" b="0" i="0" u="none" baseline="0" dirty="0">
                 <a:solidFill>
                   <a:srgbClr val="FFFF00"/>
                 </a:solidFill>
@@ -27052,7 +28082,7 @@
                 <a:cs typeface="Courier"/>
                 <a:sym typeface="Courier New"/>
               </a:rPr>
-              <a:t>counts = dict()</a:t>
+              <a:t>bigcount = None</a:t>
             </a:r>
           </a:p>
           <a:p>
@@ -27063,16 +28093,16 @@
               <a:buSzPct val="25000"/>
             </a:pPr>
             <a:r>
-              <a:rPr lang="pl" sz="2800" b="0" i="0" u="none" baseline="0">
-                <a:solidFill>
-                  <a:srgbClr val="00FA00"/>
+              <a:rPr lang="pl" sz="2800" b="0" i="0" u="none" baseline="0" dirty="0">
+                <a:solidFill>
+                  <a:srgbClr val="FFFF00"/>
                 </a:solidFill>
                 <a:latin typeface="Courier"/>
                 <a:ea typeface="Courier"/>
                 <a:cs typeface="Courier"/>
                 <a:sym typeface="Courier New"/>
               </a:rPr>
-              <a:t>for line in handle:</a:t>
+              <a:t>bigword = None</a:t>
             </a:r>
           </a:p>
           <a:p>
@@ -27083,7 +28113,7 @@
               <a:buSzPct val="25000"/>
             </a:pPr>
             <a:r>
-              <a:rPr lang="pl" sz="2800" b="0" i="0" u="none" baseline="0">
+              <a:rPr lang="en-US" sz="2800" b="0" i="0" u="none" baseline="0" dirty="0">
                 <a:solidFill>
                   <a:srgbClr val="00FA00"/>
                 </a:solidFill>
@@ -27092,18 +28122,10 @@
                 <a:cs typeface="Courier"/>
                 <a:sym typeface="Courier New"/>
               </a:rPr>
-              <a:t>    words = line.split()</a:t>
-            </a:r>
-          </a:p>
-          <a:p>
-            <a:pPr lvl="0" algn="l" rtl="0">
-              <a:buClr>
-                <a:srgbClr val="00FF00"/>
-              </a:buClr>
-              <a:buSzPct val="25000"/>
-            </a:pPr>
-            <a:r>
-              <a:rPr lang="pl" sz="2800" b="0" i="0" u="none" baseline="0">
+              <a:t>for word, count in list(</a:t>
+            </a:r>
+            <a:r>
+              <a:rPr lang="en-US" sz="2800" b="0" i="0" u="none" baseline="0" dirty="0" err="1">
                 <a:solidFill>
                   <a:srgbClr val="00FA00"/>
                 </a:solidFill>
@@ -27112,18 +28134,10 @@
                 <a:cs typeface="Courier"/>
                 <a:sym typeface="Courier New"/>
               </a:rPr>
-              <a:t>    for word in words:</a:t>
-            </a:r>
-          </a:p>
-          <a:p>
-            <a:pPr lvl="0" algn="l" rtl="0">
-              <a:buClr>
-                <a:srgbClr val="00FF00"/>
-              </a:buClr>
-              <a:buSzPct val="25000"/>
-            </a:pPr>
-            <a:r>
-              <a:rPr lang="pl" sz="2800" b="0" i="0" u="none" baseline="0">
+              <a:t>counts.items</a:t>
+            </a:r>
+            <a:r>
+              <a:rPr lang="en-US" sz="2800" b="0" i="0" u="none" baseline="0" dirty="0">
                 <a:solidFill>
                   <a:srgbClr val="00FA00"/>
                 </a:solidFill>
@@ -27132,7 +28146,97 @@
                 <a:cs typeface="Courier"/>
                 <a:sym typeface="Courier New"/>
               </a:rPr>
-              <a:t>        counts[word] = counts.get(word,0) + 1</a:t>
+              <a:t>()):</a:t>
+            </a:r>
+            <a:endParaRPr lang="pl" sz="2800" b="0" i="0" u="none" baseline="0" dirty="0">
+              <a:solidFill>
+                <a:srgbClr val="00FA00"/>
+              </a:solidFill>
+              <a:latin typeface="Courier"/>
+              <a:ea typeface="Courier"/>
+              <a:cs typeface="Courier"/>
+              <a:sym typeface="Courier New"/>
+            </a:endParaRPr>
+          </a:p>
+          <a:p>
+            <a:pPr lvl="0" algn="l" rtl="0">
+              <a:buClr>
+                <a:srgbClr val="00FF00"/>
+              </a:buClr>
+              <a:buSzPct val="25000"/>
+            </a:pPr>
+            <a:r>
+              <a:rPr lang="pl" sz="2800" b="0" i="0" u="none" baseline="0" dirty="0">
+                <a:solidFill>
+                  <a:srgbClr val="FF9300"/>
+                </a:solidFill>
+                <a:latin typeface="Courier"/>
+                <a:ea typeface="Courier"/>
+                <a:cs typeface="Courier"/>
+                <a:sym typeface="Courier New"/>
+              </a:rPr>
+              <a:t>    if bigcount is None or count &gt; bigcount:</a:t>
+            </a:r>
+          </a:p>
+          <a:p>
+            <a:pPr lvl="0" algn="l" rtl="0">
+              <a:buClr>
+                <a:srgbClr val="00FF00"/>
+              </a:buClr>
+              <a:buSzPct val="25000"/>
+            </a:pPr>
+            <a:r>
+              <a:rPr lang="pl" sz="2800" b="0" i="0" u="none" baseline="0" dirty="0">
+                <a:solidFill>
+                  <a:srgbClr val="FF9300"/>
+                </a:solidFill>
+                <a:latin typeface="Courier"/>
+                <a:ea typeface="Courier"/>
+                <a:cs typeface="Courier"/>
+                <a:sym typeface="Courier New"/>
+              </a:rPr>
+              <a:t>        bigword = </a:t>
+            </a:r>
+            <a:r>
+              <a:rPr lang="en-US" sz="2800" b="0" i="0" u="none" baseline="0" dirty="0">
+                <a:solidFill>
+                  <a:srgbClr val="FF9300"/>
+                </a:solidFill>
+                <a:latin typeface="Courier"/>
+                <a:ea typeface="Courier"/>
+                <a:cs typeface="Courier"/>
+                <a:sym typeface="Courier New"/>
+              </a:rPr>
+              <a:t>word</a:t>
+            </a:r>
+            <a:endParaRPr lang="pl" sz="2800" b="0" i="0" u="none" baseline="0" dirty="0">
+              <a:solidFill>
+                <a:srgbClr val="FF9300"/>
+              </a:solidFill>
+              <a:latin typeface="Courier"/>
+              <a:ea typeface="Courier"/>
+              <a:cs typeface="Courier"/>
+              <a:sym typeface="Courier New"/>
+            </a:endParaRPr>
+          </a:p>
+          <a:p>
+            <a:pPr lvl="0" algn="l" rtl="0">
+              <a:buClr>
+                <a:srgbClr val="00FF00"/>
+              </a:buClr>
+              <a:buSzPct val="25000"/>
+            </a:pPr>
+            <a:r>
+              <a:rPr lang="pl" sz="2800" b="0" i="0" u="none" baseline="0" dirty="0">
+                <a:solidFill>
+                  <a:srgbClr val="FF9300"/>
+                </a:solidFill>
+                <a:latin typeface="Courier"/>
+                <a:ea typeface="Courier"/>
+                <a:cs typeface="Courier"/>
+                <a:sym typeface="Courier New"/>
+              </a:rPr>
+              <a:t>        bigcount = count</a:t>
             </a:r>
           </a:p>
           <a:p>
@@ -27159,143 +28263,7 @@
               <a:buSzPct val="25000"/>
             </a:pPr>
             <a:r>
-              <a:rPr lang="pl" sz="2800" b="0" i="0" u="none" baseline="0">
-                <a:solidFill>
-                  <a:srgbClr val="FFFF00"/>
-                </a:solidFill>
-                <a:latin typeface="Courier"/>
-                <a:ea typeface="Courier"/>
-                <a:cs typeface="Courier"/>
-                <a:sym typeface="Courier New"/>
-              </a:rPr>
-              <a:t>bigcount = None</a:t>
-            </a:r>
-          </a:p>
-          <a:p>
-            <a:pPr lvl="0" algn="l" rtl="0">
-              <a:buClr>
-                <a:srgbClr val="00FF00"/>
-              </a:buClr>
-              <a:buSzPct val="25000"/>
-            </a:pPr>
-            <a:r>
-              <a:rPr lang="pl" sz="2800" b="0" i="0" u="none" baseline="0">
-                <a:solidFill>
-                  <a:srgbClr val="FFFF00"/>
-                </a:solidFill>
-                <a:latin typeface="Courier"/>
-                <a:ea typeface="Courier"/>
-                <a:cs typeface="Courier"/>
-                <a:sym typeface="Courier New"/>
-              </a:rPr>
-              <a:t>bigword = None</a:t>
-            </a:r>
-          </a:p>
-          <a:p>
-            <a:pPr lvl="0" algn="l" rtl="0">
-              <a:buClr>
-                <a:srgbClr val="00FF00"/>
-              </a:buClr>
-              <a:buSzPct val="25000"/>
-            </a:pPr>
-            <a:r>
-              <a:rPr lang="pl" sz="2800" b="0" i="0" u="none" baseline="0">
-                <a:solidFill>
-                  <a:srgbClr val="00FA00"/>
-                </a:solidFill>
-                <a:latin typeface="Courier"/>
-                <a:ea typeface="Courier"/>
-                <a:cs typeface="Courier"/>
-                <a:sym typeface="Courier New"/>
-              </a:rPr>
-              <a:t>for word,count in counts.items():</a:t>
-            </a:r>
-          </a:p>
-          <a:p>
-            <a:pPr lvl="0" algn="l" rtl="0">
-              <a:buClr>
-                <a:srgbClr val="00FF00"/>
-              </a:buClr>
-              <a:buSzPct val="25000"/>
-            </a:pPr>
-            <a:r>
-              <a:rPr lang="pl" sz="2800" b="0" i="0" u="none" baseline="0">
-                <a:solidFill>
-                  <a:srgbClr val="FF9300"/>
-                </a:solidFill>
-                <a:latin typeface="Courier"/>
-                <a:ea typeface="Courier"/>
-                <a:cs typeface="Courier"/>
-                <a:sym typeface="Courier New"/>
-              </a:rPr>
-              <a:t>    if bigcount is None or count &gt; bigcount:</a:t>
-            </a:r>
-          </a:p>
-          <a:p>
-            <a:pPr lvl="0" algn="l" rtl="0">
-              <a:buClr>
-                <a:srgbClr val="00FF00"/>
-              </a:buClr>
-              <a:buSzPct val="25000"/>
-            </a:pPr>
-            <a:r>
-              <a:rPr lang="pl" sz="2800" b="0" i="0" u="none" baseline="0">
-                <a:solidFill>
-                  <a:srgbClr val="FF9300"/>
-                </a:solidFill>
-                <a:latin typeface="Courier"/>
-                <a:ea typeface="Courier"/>
-                <a:cs typeface="Courier"/>
-                <a:sym typeface="Courier New"/>
-              </a:rPr>
-              <a:t>        bigword = None</a:t>
-            </a:r>
-          </a:p>
-          <a:p>
-            <a:pPr lvl="0" algn="l" rtl="0">
-              <a:buClr>
-                <a:srgbClr val="00FF00"/>
-              </a:buClr>
-              <a:buSzPct val="25000"/>
-            </a:pPr>
-            <a:r>
-              <a:rPr lang="pl" sz="2800" b="0" i="0" u="none" baseline="0">
-                <a:solidFill>
-                  <a:srgbClr val="FF9300"/>
-                </a:solidFill>
-                <a:latin typeface="Courier"/>
-                <a:ea typeface="Courier"/>
-                <a:cs typeface="Courier"/>
-                <a:sym typeface="Courier New"/>
-              </a:rPr>
-              <a:t>        bigcount = count</a:t>
-            </a:r>
-          </a:p>
-          <a:p>
-            <a:pPr lvl="0" algn="l" rtl="0">
-              <a:buClr>
-                <a:srgbClr val="00FF00"/>
-              </a:buClr>
-            </a:pPr>
-            <a:endParaRPr lang="pl" sz="2800" dirty="0">
-              <a:solidFill>
-                <a:srgbClr val="00FF00"/>
-              </a:solidFill>
-              <a:latin typeface="Courier"/>
-              <a:ea typeface="Courier"/>
-              <a:cs typeface="Courier"/>
-              <a:sym typeface="Courier New"/>
-            </a:endParaRPr>
-          </a:p>
-          <a:p>
-            <a:pPr lvl="0" algn="l" rtl="0">
-              <a:buClr>
-                <a:srgbClr val="00FF00"/>
-              </a:buClr>
-              <a:buSzPct val="25000"/>
-            </a:pPr>
-            <a:r>
-              <a:rPr lang="pl" sz="2800" b="0" i="0" u="none" baseline="0">
+              <a:rPr lang="pl" sz="2800" b="0" i="0" u="none" baseline="0" dirty="0">
                 <a:solidFill>
                   <a:srgbClr val="FFFF00"/>
                 </a:solidFill>
@@ -27496,7 +28464,7 @@
               <a:buNone/>
             </a:pPr>
             <a:r>
-              <a:rPr lang="pl" sz="2800" b="0" i="0" u="none" strike="noStrike" cap="none" baseline="0">
+              <a:rPr lang="pl" sz="2800" b="0" i="0" u="none" strike="noStrike" cap="none" baseline="0" dirty="0">
                 <a:solidFill>
                   <a:srgbClr val="FFFF00"/>
                 </a:solidFill>
@@ -27508,7 +28476,7 @@
               <a:t>name = </a:t>
             </a:r>
             <a:r>
-              <a:rPr lang="pl" sz="2800" b="0" i="0" u="none" strike="noStrike" cap="none" baseline="0">
+              <a:rPr lang="pl" sz="2800" b="0" i="0" u="none" strike="noStrike" cap="none" baseline="0" dirty="0">
                 <a:solidFill>
                   <a:schemeClr val="bg1"/>
                 </a:solidFill>
@@ -27520,7 +28488,7 @@
               <a:t>input</a:t>
             </a:r>
             <a:r>
-              <a:rPr lang="pl" sz="2800" b="0" i="0" u="none" strike="noStrike" cap="none" baseline="0">
+              <a:rPr lang="pl" sz="2800" b="0" i="0" u="none" strike="noStrike" cap="none" baseline="0" dirty="0">
                 <a:solidFill>
                   <a:srgbClr val="FFFF00"/>
                 </a:solidFill>
@@ -27529,29 +28497,10 @@
                 <a:cs typeface="Courier"/>
                 <a:sym typeface="Courier New"/>
               </a:rPr>
-              <a:t>('Nazwa pliku:')</a:t>
-            </a:r>
-          </a:p>
-          <a:p>
-            <a:pPr marL="0" marR="0" lvl="0" indent="0" algn="l" rtl="0">
-              <a:lnSpc>
-                <a:spcPct val="100000"/>
-              </a:lnSpc>
-              <a:spcBef>
-                <a:spcPts val="0"/>
-              </a:spcBef>
-              <a:spcAft>
-                <a:spcPts val="0"/>
-              </a:spcAft>
-              <a:buClr>
-                <a:srgbClr val="00FF00"/>
-              </a:buClr>
-              <a:buSzPct val="25000"/>
-              <a:buFont typeface="Cabin"/>
-              <a:buNone/>
-            </a:pPr>
-            <a:r>
-              <a:rPr lang="pl" sz="2800" b="0" i="0" u="none" strike="noStrike" cap="none" baseline="0">
+              <a:t>('</a:t>
+            </a:r>
+            <a:r>
+              <a:rPr lang="pl-PL" sz="2800" b="0" i="0" u="none" strike="noStrike" cap="none" baseline="0" dirty="0">
                 <a:solidFill>
                   <a:srgbClr val="FFFF00"/>
                 </a:solidFill>
@@ -27560,11 +28509,23 @@
                 <a:cs typeface="Courier"/>
                 <a:sym typeface="Courier New"/>
               </a:rPr>
-              <a:t>handle = open(name)</a:t>
-            </a:r>
-          </a:p>
-          <a:p>
-            <a:pPr marL="0" marR="0" lvl="0" indent="0" algn="ctr" rtl="0">
+              <a:t>Podaj nazwę pliku: </a:t>
+            </a:r>
+            <a:r>
+              <a:rPr lang="pl" sz="2800" b="0" i="0" u="none" strike="noStrike" cap="none" baseline="0" dirty="0">
+                <a:solidFill>
+                  <a:srgbClr val="FFFF00"/>
+                </a:solidFill>
+                <a:latin typeface="Courier"/>
+                <a:ea typeface="Courier"/>
+                <a:cs typeface="Courier"/>
+                <a:sym typeface="Courier New"/>
+              </a:rPr>
+              <a:t>')</a:t>
+            </a:r>
+          </a:p>
+          <a:p>
+            <a:pPr marL="0" marR="0" lvl="0" indent="0" algn="l" rtl="0">
               <a:lnSpc>
                 <a:spcPct val="100000"/>
               </a:lnSpc>
@@ -27574,8 +28535,49 @@
               <a:spcAft>
                 <a:spcPts val="0"/>
               </a:spcAft>
-              <a:buNone/>
-            </a:pPr>
+              <a:buClr>
+                <a:srgbClr val="00FF00"/>
+              </a:buClr>
+              <a:buSzPct val="25000"/>
+              <a:buFont typeface="Cabin"/>
+              <a:buNone/>
+            </a:pPr>
+            <a:r>
+              <a:rPr lang="pl" sz="2800" b="0" i="0" u="none" strike="noStrike" cap="none" baseline="0" dirty="0">
+                <a:solidFill>
+                  <a:srgbClr val="FFFF00"/>
+                </a:solidFill>
+                <a:latin typeface="Courier"/>
+                <a:ea typeface="Courier"/>
+                <a:cs typeface="Courier"/>
+                <a:sym typeface="Courier New"/>
+              </a:rPr>
+              <a:t>handle = open(name</a:t>
+            </a:r>
+            <a:r>
+              <a:rPr lang="pl-PL" sz="2800" b="0" i="0" u="none" strike="noStrike" cap="none" baseline="0" dirty="0">
+                <a:solidFill>
+                  <a:srgbClr val="FFFF00"/>
+                </a:solidFill>
+                <a:latin typeface="Courier"/>
+                <a:ea typeface="Courier"/>
+                <a:cs typeface="Courier"/>
+                <a:sym typeface="Courier New"/>
+              </a:rPr>
+              <a:t>, 'r'</a:t>
+            </a:r>
+            <a:r>
+              <a:rPr lang="pl" sz="2800" b="0" i="0" u="none" strike="noStrike" cap="none" baseline="0" dirty="0">
+                <a:solidFill>
+                  <a:srgbClr val="FFFF00"/>
+                </a:solidFill>
+                <a:latin typeface="Courier"/>
+                <a:ea typeface="Courier"/>
+                <a:cs typeface="Courier"/>
+                <a:sym typeface="Courier New"/>
+              </a:rPr>
+              <a:t>)</a:t>
+            </a:r>
             <a:endParaRPr sz="2800" i="0" u="none" strike="noStrike" cap="none" dirty="0">
               <a:solidFill>
                 <a:srgbClr val="00FF00"/>
@@ -27605,7 +28607,7 @@
               <a:buNone/>
             </a:pPr>
             <a:r>
-              <a:rPr lang="pl" sz="2800" b="0" i="0" u="none" strike="noStrike" cap="none" baseline="0">
+              <a:rPr lang="pl" sz="2800" b="0" i="0" u="none" strike="noStrike" cap="none" baseline="0" dirty="0">
                 <a:solidFill>
                   <a:srgbClr val="FFFF00"/>
                 </a:solidFill>
@@ -27616,6 +28618,43 @@
               </a:rPr>
               <a:t>counts = dict()</a:t>
             </a:r>
+            <a:endParaRPr lang="en-US" sz="2800" b="0" i="0" u="none" strike="noStrike" cap="none" baseline="0" dirty="0">
+              <a:solidFill>
+                <a:srgbClr val="FFFF00"/>
+              </a:solidFill>
+              <a:latin typeface="Courier"/>
+              <a:ea typeface="Courier"/>
+              <a:cs typeface="Courier"/>
+              <a:sym typeface="Courier New"/>
+            </a:endParaRPr>
+          </a:p>
+          <a:p>
+            <a:pPr marL="0" marR="0" lvl="0" indent="0" algn="l" rtl="0">
+              <a:lnSpc>
+                <a:spcPct val="100000"/>
+              </a:lnSpc>
+              <a:spcBef>
+                <a:spcPts val="0"/>
+              </a:spcBef>
+              <a:spcAft>
+                <a:spcPts val="0"/>
+              </a:spcAft>
+              <a:buClr>
+                <a:srgbClr val="00FF00"/>
+              </a:buClr>
+              <a:buSzPct val="25000"/>
+              <a:buFont typeface="Cabin"/>
+              <a:buNone/>
+            </a:pPr>
+            <a:endParaRPr lang="pl" sz="2800" b="0" i="0" u="none" strike="noStrike" cap="none" baseline="0" dirty="0">
+              <a:solidFill>
+                <a:srgbClr val="FFFF00"/>
+              </a:solidFill>
+              <a:latin typeface="Courier"/>
+              <a:ea typeface="Courier"/>
+              <a:cs typeface="Courier"/>
+              <a:sym typeface="Courier New"/>
+            </a:endParaRPr>
           </a:p>
           <a:p>
             <a:pPr lvl="0" algn="l" rtl="0">
@@ -27625,7 +28664,7 @@
               <a:buSzPct val="25000"/>
             </a:pPr>
             <a:r>
-              <a:rPr lang="pl" sz="2800" b="0" i="0" u="none" baseline="0">
+              <a:rPr lang="pl" sz="2800" b="0" i="0" u="none" baseline="0" dirty="0">
                 <a:solidFill>
                   <a:srgbClr val="00FF00"/>
                 </a:solidFill>
@@ -27636,6 +28675,15 @@
               </a:rPr>
               <a:t>for line in handle:</a:t>
             </a:r>
+            <a:endParaRPr lang="en-US" sz="2800" b="0" i="0" u="none" baseline="0" dirty="0">
+              <a:solidFill>
+                <a:srgbClr val="00FF00"/>
+              </a:solidFill>
+              <a:latin typeface="Courier"/>
+              <a:ea typeface="Courier"/>
+              <a:cs typeface="Courier"/>
+              <a:sym typeface="Courier New"/>
+            </a:endParaRPr>
           </a:p>
           <a:p>
             <a:pPr lvl="0" algn="l" rtl="0">
@@ -27645,7 +28693,7 @@
               <a:buSzPct val="25000"/>
             </a:pPr>
             <a:r>
-              <a:rPr lang="pl" sz="2800" b="0" i="0" u="none" baseline="0">
+              <a:rPr lang="en-US" sz="2800" dirty="0">
                 <a:solidFill>
                   <a:srgbClr val="00FF00"/>
                 </a:solidFill>
@@ -27654,18 +28702,10 @@
                 <a:cs typeface="Courier"/>
                 <a:sym typeface="Courier New"/>
               </a:rPr>
-              <a:t>    words = line.split()</a:t>
-            </a:r>
-          </a:p>
-          <a:p>
-            <a:pPr lvl="0" algn="l" rtl="0">
-              <a:buClr>
-                <a:srgbClr val="00FF00"/>
-              </a:buClr>
-              <a:buSzPct val="25000"/>
-            </a:pPr>
-            <a:r>
-              <a:rPr lang="pl" sz="2800" b="0" i="0" u="none" baseline="0">
+              <a:t>    line = </a:t>
+            </a:r>
+            <a:r>
+              <a:rPr lang="en-US" sz="2800" dirty="0" err="1">
                 <a:solidFill>
                   <a:srgbClr val="00FF00"/>
                 </a:solidFill>
@@ -27674,18 +28714,10 @@
                 <a:cs typeface="Courier"/>
                 <a:sym typeface="Courier New"/>
               </a:rPr>
-              <a:t>    for word in words:</a:t>
-            </a:r>
-          </a:p>
-          <a:p>
-            <a:pPr lvl="0" algn="l" rtl="0">
-              <a:buClr>
-                <a:srgbClr val="00FF00"/>
-              </a:buClr>
-              <a:buSzPct val="25000"/>
-            </a:pPr>
-            <a:r>
-              <a:rPr lang="pl" sz="2800" b="0" i="0" u="none" baseline="0">
+              <a:t>line.lower</a:t>
+            </a:r>
+            <a:r>
+              <a:rPr lang="en-US" sz="2800" dirty="0">
                 <a:solidFill>
                   <a:srgbClr val="00FF00"/>
                 </a:solidFill>
@@ -27694,7 +28726,100 @@
                 <a:cs typeface="Courier"/>
                 <a:sym typeface="Courier New"/>
               </a:rPr>
-              <a:t>        counts[word] = counts.get(word,0) + 1</a:t>
+              <a:t>()</a:t>
+            </a:r>
+            <a:endParaRPr lang="pl" sz="2800" b="0" i="0" u="none" baseline="0" dirty="0">
+              <a:solidFill>
+                <a:srgbClr val="00FF00"/>
+              </a:solidFill>
+              <a:latin typeface="Courier"/>
+              <a:ea typeface="Courier"/>
+              <a:cs typeface="Courier"/>
+              <a:sym typeface="Courier New"/>
+            </a:endParaRPr>
+          </a:p>
+          <a:p>
+            <a:pPr lvl="0" algn="l" rtl="0">
+              <a:buClr>
+                <a:srgbClr val="00FF00"/>
+              </a:buClr>
+              <a:buSzPct val="25000"/>
+            </a:pPr>
+            <a:r>
+              <a:rPr lang="pl" sz="2800" b="0" i="0" u="none" baseline="0" dirty="0">
+                <a:solidFill>
+                  <a:srgbClr val="00FF00"/>
+                </a:solidFill>
+                <a:latin typeface="Courier"/>
+                <a:ea typeface="Courier"/>
+                <a:cs typeface="Courier"/>
+                <a:sym typeface="Courier New"/>
+              </a:rPr>
+              <a:t>    words = line.split()</a:t>
+            </a:r>
+          </a:p>
+          <a:p>
+            <a:pPr lvl="0" algn="l" rtl="0">
+              <a:buClr>
+                <a:srgbClr val="00FF00"/>
+              </a:buClr>
+              <a:buSzPct val="25000"/>
+            </a:pPr>
+            <a:r>
+              <a:rPr lang="pl" sz="2800" b="0" i="0" u="none" baseline="0" dirty="0">
+                <a:solidFill>
+                  <a:srgbClr val="00FF00"/>
+                </a:solidFill>
+                <a:latin typeface="Courier"/>
+                <a:ea typeface="Courier"/>
+                <a:cs typeface="Courier"/>
+                <a:sym typeface="Courier New"/>
+              </a:rPr>
+              <a:t>    for word in words:</a:t>
+            </a:r>
+          </a:p>
+          <a:p>
+            <a:pPr lvl="0" algn="l" rtl="0">
+              <a:buClr>
+                <a:srgbClr val="00FF00"/>
+              </a:buClr>
+              <a:buSzPct val="25000"/>
+            </a:pPr>
+            <a:r>
+              <a:rPr lang="pl" sz="2800" b="0" i="0" u="none" baseline="0" dirty="0">
+                <a:solidFill>
+                  <a:srgbClr val="00FF00"/>
+                </a:solidFill>
+                <a:latin typeface="Courier"/>
+                <a:ea typeface="Courier"/>
+                <a:cs typeface="Courier"/>
+                <a:sym typeface="Courier New"/>
+              </a:rPr>
+              <a:t>        counts[word] = counts.get(word,</a:t>
+            </a:r>
+            <a:r>
+              <a:rPr lang="en-US" sz="2800" b="0" i="0" u="none" baseline="0" dirty="0">
+                <a:solidFill>
+                  <a:srgbClr val="00FF00"/>
+                </a:solidFill>
+                <a:latin typeface="Courier"/>
+                <a:ea typeface="Courier"/>
+                <a:cs typeface="Courier"/>
+                <a:sym typeface="Courier New"/>
+              </a:rPr>
+              <a:t> </a:t>
+            </a:r>
+            <a:r>
+              <a:rPr lang="pl" sz="2800" b="0" i="0" u="none" baseline="0" dirty="0">
+                <a:solidFill>
+                  <a:srgbClr val="00FF00"/>
+                </a:solidFill>
+                <a:latin typeface="Courier"/>
+                <a:ea typeface="Courier"/>
+                <a:cs typeface="Courier"/>
+                <a:sym typeface="Courier New"/>
+              </a:rPr>
+              <a:t>0) + 1</a:t>
             </a:r>
           </a:p>
           <a:p>
@@ -27744,7 +28869,7 @@
               <a:buNone/>
             </a:pPr>
             <a:r>
-              <a:rPr lang="pl" sz="2800" b="0" i="0" u="none" strike="noStrike" cap="none" baseline="0">
+              <a:rPr lang="pl" sz="2800" b="0" i="0" u="none" strike="noStrike" cap="none" baseline="0" dirty="0">
                 <a:solidFill>
                   <a:srgbClr val="FFFF00"/>
                 </a:solidFill>
@@ -27775,7 +28900,7 @@
               <a:buNone/>
             </a:pPr>
             <a:r>
-              <a:rPr lang="pl" sz="2800" b="0" i="0" u="none" strike="noStrike" cap="none" baseline="0">
+              <a:rPr lang="pl" sz="2800" b="0" i="0" u="none" strike="noStrike" cap="none" baseline="0" dirty="0">
                 <a:solidFill>
                   <a:srgbClr val="FFFF00"/>
                 </a:solidFill>
@@ -27806,7 +28931,7 @@
               <a:buNone/>
             </a:pPr>
             <a:r>
-              <a:rPr lang="pl" sz="2800" b="0" i="0" u="none" strike="noStrike" cap="none" baseline="0">
+              <a:rPr lang="en-US" sz="2800" b="0" i="0" u="none" strike="noStrike" cap="none" baseline="0" dirty="0">
                 <a:solidFill>
                   <a:srgbClr val="00FF00"/>
                 </a:solidFill>
@@ -27815,93 +28940,95 @@
                 <a:cs typeface="Courier"/>
                 <a:sym typeface="Courier New"/>
               </a:rPr>
-              <a:t>for word,count in counts.items():</a:t>
-            </a:r>
-          </a:p>
-          <a:p>
-            <a:pPr marL="0" marR="0" lvl="0" indent="0" algn="l" rtl="0">
-              <a:lnSpc>
-                <a:spcPct val="100000"/>
-              </a:lnSpc>
-              <a:spcBef>
-                <a:spcPts val="0"/>
-              </a:spcBef>
-              <a:spcAft>
-                <a:spcPts val="0"/>
-              </a:spcAft>
-              <a:buClr>
-                <a:srgbClr val="00FF00"/>
-              </a:buClr>
-              <a:buSzPct val="25000"/>
-              <a:buFont typeface="Cabin"/>
-              <a:buNone/>
-            </a:pPr>
-            <a:r>
-              <a:rPr lang="pl" sz="2800" b="0" i="0" u="none" strike="noStrike" cap="none" baseline="0">
-                <a:solidFill>
-                  <a:srgbClr val="FF00FF"/>
+              <a:t>for word, count in list(</a:t>
+            </a:r>
+            <a:r>
+              <a:rPr lang="en-US" sz="2800" b="0" i="0" u="none" strike="noStrike" cap="none" baseline="0" dirty="0" err="1">
+                <a:solidFill>
+                  <a:srgbClr val="00FF00"/>
                 </a:solidFill>
                 <a:latin typeface="Courier"/>
                 <a:ea typeface="Courier"/>
                 <a:cs typeface="Courier"/>
                 <a:sym typeface="Courier New"/>
               </a:rPr>
-              <a:t>  </a:t>
-            </a:r>
-            <a:r>
-              <a:rPr lang="pl" sz="2800" b="0" i="0" u="none" strike="noStrike" cap="none" baseline="0">
-                <a:solidFill>
-                  <a:srgbClr val="FF7F00"/>
+              <a:t>counts.items</a:t>
+            </a:r>
+            <a:r>
+              <a:rPr lang="en-US" sz="2800" b="0" i="0" u="none" strike="noStrike" cap="none" baseline="0" dirty="0">
+                <a:solidFill>
+                  <a:srgbClr val="00FF00"/>
                 </a:solidFill>
                 <a:latin typeface="Courier"/>
                 <a:ea typeface="Courier"/>
                 <a:cs typeface="Courier"/>
                 <a:sym typeface="Courier New"/>
               </a:rPr>
-              <a:t>  </a:t>
-            </a:r>
-            <a:r>
-              <a:rPr lang="pl" sz="2800" b="0" i="0" u="none" strike="noStrike" cap="none" baseline="0">
-                <a:solidFill>
-                  <a:srgbClr val="FF9900"/>
+              <a:t>()):</a:t>
+            </a:r>
+            <a:endParaRPr lang="pl" sz="2800" b="0" i="0" u="none" strike="noStrike" cap="none" baseline="0" dirty="0">
+              <a:solidFill>
+                <a:srgbClr val="00FF00"/>
+              </a:solidFill>
+              <a:latin typeface="Courier"/>
+              <a:ea typeface="Courier"/>
+              <a:cs typeface="Courier"/>
+              <a:sym typeface="Courier New"/>
+            </a:endParaRPr>
+          </a:p>
+          <a:p>
+            <a:pPr marL="0" marR="0" lvl="0" indent="0" algn="l" rtl="0">
+              <a:lnSpc>
+                <a:spcPct val="100000"/>
+              </a:lnSpc>
+              <a:spcBef>
+                <a:spcPts val="0"/>
+              </a:spcBef>
+              <a:spcAft>
+                <a:spcPts val="0"/>
+              </a:spcAft>
+              <a:buClr>
+                <a:srgbClr val="00FF00"/>
+              </a:buClr>
+              <a:buSzPct val="25000"/>
+              <a:buFont typeface="Cabin"/>
+              <a:buNone/>
+            </a:pPr>
+            <a:r>
+              <a:rPr lang="pl" sz="2800" b="0" i="0" u="none" strike="noStrike" cap="none" baseline="0" dirty="0">
+                <a:solidFill>
+                  <a:srgbClr val="FF00FF"/>
                 </a:solidFill>
                 <a:latin typeface="Courier"/>
                 <a:ea typeface="Courier"/>
                 <a:cs typeface="Courier"/>
                 <a:sym typeface="Courier New"/>
               </a:rPr>
-              <a:t>if bigcount is None or count &gt; bigcount:</a:t>
-            </a:r>
-          </a:p>
-          <a:p>
-            <a:pPr marL="0" marR="0" lvl="0" indent="0" algn="l" rtl="0">
-              <a:lnSpc>
-                <a:spcPct val="100000"/>
-              </a:lnSpc>
-              <a:spcBef>
-                <a:spcPts val="0"/>
-              </a:spcBef>
-              <a:spcAft>
-                <a:spcPts val="0"/>
-              </a:spcAft>
-              <a:buClr>
-                <a:srgbClr val="00FF00"/>
-              </a:buClr>
-              <a:buSzPct val="25000"/>
-              <a:buFont typeface="Cabin"/>
-              <a:buNone/>
-            </a:pPr>
-            <a:r>
-              <a:rPr lang="pl" sz="2800" b="0" i="0" u="none" strike="noStrike" cap="none" baseline="0">
-                <a:solidFill>
-                  <a:srgbClr val="FF9900"/>
+              <a:t>  </a:t>
+            </a:r>
+            <a:r>
+              <a:rPr lang="pl" sz="2800" b="0" i="0" u="none" strike="noStrike" cap="none" baseline="0" dirty="0">
+                <a:solidFill>
+                  <a:srgbClr val="FF7F00"/>
                 </a:solidFill>
                 <a:latin typeface="Courier"/>
                 <a:ea typeface="Courier"/>
                 <a:cs typeface="Courier"/>
                 <a:sym typeface="Courier New"/>
               </a:rPr>
-              <a:t>        bigword = None</a:t>
+              <a:t>  </a:t>
+            </a:r>
+            <a:r>
+              <a:rPr lang="pl" sz="2800" b="0" i="0" u="none" strike="noStrike" cap="none" baseline="0" dirty="0">
+                <a:solidFill>
+                  <a:srgbClr val="FF9900"/>
+                </a:solidFill>
+                <a:latin typeface="Courier"/>
+                <a:ea typeface="Courier"/>
+                <a:cs typeface="Courier"/>
+                <a:sym typeface="Courier New"/>
+              </a:rPr>
+              <a:t>if bigcount is None or count &gt; bigcount:</a:t>
             </a:r>
           </a:p>
           <a:p>
@@ -27923,7 +29050,59 @@
               <a:buNone/>
             </a:pPr>
             <a:r>
-              <a:rPr lang="pl" sz="2800" b="0" i="0" u="none" strike="noStrike" cap="none" baseline="0">
+              <a:rPr lang="pl" sz="2800" b="0" i="0" u="none" strike="noStrike" cap="none" baseline="0" dirty="0">
+                <a:solidFill>
+                  <a:srgbClr val="FF9900"/>
+                </a:solidFill>
+                <a:latin typeface="Courier"/>
+                <a:ea typeface="Courier"/>
+                <a:cs typeface="Courier"/>
+                <a:sym typeface="Courier New"/>
+              </a:rPr>
+              <a:t>        bigword = </a:t>
+            </a:r>
+            <a:r>
+              <a:rPr lang="en-US" sz="2800" b="0" i="0" u="none" strike="noStrike" cap="none" baseline="0" dirty="0">
+                <a:solidFill>
+                  <a:srgbClr val="FF9900"/>
+                </a:solidFill>
+                <a:latin typeface="Courier"/>
+                <a:ea typeface="Courier"/>
+                <a:cs typeface="Courier"/>
+                <a:sym typeface="Courier New"/>
+              </a:rPr>
+              <a:t>word</a:t>
+            </a:r>
+            <a:endParaRPr lang="pl" sz="2800" b="0" i="0" u="none" strike="noStrike" cap="none" baseline="0" dirty="0">
+              <a:solidFill>
+                <a:srgbClr val="FF9900"/>
+              </a:solidFill>
+              <a:latin typeface="Courier"/>
+              <a:ea typeface="Courier"/>
+              <a:cs typeface="Courier"/>
+              <a:sym typeface="Courier New"/>
+            </a:endParaRPr>
+          </a:p>
+          <a:p>
+            <a:pPr marL="0" marR="0" lvl="0" indent="0" algn="l" rtl="0">
+              <a:lnSpc>
+                <a:spcPct val="100000"/>
+              </a:lnSpc>
+              <a:spcBef>
+                <a:spcPts val="0"/>
+              </a:spcBef>
+              <a:spcAft>
+                <a:spcPts val="0"/>
+              </a:spcAft>
+              <a:buClr>
+                <a:srgbClr val="00FF00"/>
+              </a:buClr>
+              <a:buSzPct val="25000"/>
+              <a:buFont typeface="Cabin"/>
+              <a:buNone/>
+            </a:pPr>
+            <a:r>
+              <a:rPr lang="pl" sz="2800" b="0" i="0" u="none" strike="noStrike" cap="none" baseline="0" dirty="0">
                 <a:solidFill>
                   <a:srgbClr val="FF9900"/>
                 </a:solidFill>
@@ -27981,7 +29160,7 @@
               <a:buNone/>
             </a:pPr>
             <a:r>
-              <a:rPr lang="pl" sz="2800" b="0" i="0" u="none" strike="noStrike" cap="none" baseline="0">
+              <a:rPr lang="pl" sz="2800" b="0" i="0" u="none" strike="noStrike" cap="none" baseline="0" dirty="0">
                 <a:solidFill>
                   <a:srgbClr val="FFFF00"/>
                 </a:solidFill>
@@ -28848,8 +30027,77 @@
                   <a:srgbClr val="FFFFFF"/>
                 </a:solidFill>
               </a:rPr>
-              <a:t>Autorstwo pierwszej wersji: Charles Severance, University of Michigan School of Information</a:t>
-            </a:r>
+              <a:t>Autorstwo pierwszej wersji: Charles Severance, </a:t>
+            </a:r>
+            <a:br>
+              <a:rPr lang="en-US" sz="1800" b="0" i="0" u="none" baseline="0" dirty="0">
+                <a:solidFill>
+                  <a:srgbClr val="FFFFFF"/>
+                </a:solidFill>
+              </a:rPr>
+            </a:br>
+            <a:r>
+              <a:rPr lang="pl" sz="1800" b="0" i="0" u="none" baseline="0" dirty="0">
+                <a:solidFill>
+                  <a:srgbClr val="FFFFFF"/>
+                </a:solidFill>
+              </a:rPr>
+              <a:t>University of Michigan School of Information</a:t>
+            </a:r>
+            <a:endParaRPr lang="en-US" sz="1800" b="0" i="0" u="none" baseline="0" dirty="0">
+              <a:solidFill>
+                <a:srgbClr val="FFFFFF"/>
+              </a:solidFill>
+            </a:endParaRPr>
+          </a:p>
+          <a:p>
+            <a:pPr lvl="0" algn="l" rtl="0">
+              <a:spcBef>
+                <a:spcPts val="0"/>
+              </a:spcBef>
+              <a:buNone/>
+            </a:pPr>
+            <a:endParaRPr lang="en-US" sz="1800" dirty="0">
+              <a:solidFill>
+                <a:srgbClr val="FFFFFF"/>
+              </a:solidFill>
+            </a:endParaRPr>
+          </a:p>
+          <a:p>
+            <a:pPr lvl="0" algn="l" rtl="0">
+              <a:spcBef>
+                <a:spcPts val="0"/>
+              </a:spcBef>
+              <a:buNone/>
+            </a:pPr>
+            <a:r>
+              <a:rPr lang="pl-PL" sz="1800" dirty="0">
+                <a:solidFill>
+                  <a:srgbClr val="FFFFFF"/>
+                </a:solidFill>
+              </a:rPr>
+              <a:t>Polska wersja powstała z inicjatywy Wydziału Matematyki </a:t>
+            </a:r>
+            <a:br>
+              <a:rPr lang="en-US" sz="1800" dirty="0">
+                <a:solidFill>
+                  <a:srgbClr val="FFFFFF"/>
+                </a:solidFill>
+              </a:rPr>
+            </a:br>
+            <a:r>
+              <a:rPr lang="pl-PL" sz="1800" dirty="0">
+                <a:solidFill>
+                  <a:srgbClr val="FFFFFF"/>
+                </a:solidFill>
+              </a:rPr>
+              <a:t>i Informatyki Uniwersytetu im. Adama Mickiewicza w Poznaniu</a:t>
+            </a:r>
+            <a:endParaRPr lang="en-US" sz="1800">
+              <a:solidFill>
+                <a:srgbClr val="FFFFFF"/>
+              </a:solidFill>
+            </a:endParaRPr>
           </a:p>
           <a:p>
             <a:pPr lvl="0" algn="l" rtl="0">
@@ -28877,23 +30125,7 @@
                   <a:srgbClr val="FFFFFF"/>
                 </a:solidFill>
               </a:rPr>
-              <a:t>Tłumaczenie</a:t>
-            </a:r>
-            <a:r>
-              <a:rPr lang="pl" sz="1800" b="0" i="0" u="none" baseline="0">
-                <a:solidFill>
-                  <a:srgbClr val="FFFFFF"/>
-                </a:solidFill>
-              </a:rPr>
-              <a:t>: Agata i Krzysztof Wierzbiccy</a:t>
-            </a:r>
-            <a:r>
-              <a:rPr lang="pl" sz="1800" b="0" i="0" u="none" baseline="0" dirty="0">
-                <a:solidFill>
-                  <a:srgbClr val="FFFFFF"/>
-                </a:solidFill>
-              </a:rPr>
-              <a:t>, EnglishT.eu </a:t>
+              <a:t>Tłumaczenie: Agata i Krzysztof Wierzbiccy, EnglishT.eu </a:t>
             </a:r>
           </a:p>
           <a:p>
@@ -29383,7 +30615,7 @@
         </p:blipFill>
         <p:spPr>
           <a:xfrm>
-            <a:off x="9155292" y="1148265"/>
+            <a:off x="9788483" y="1064206"/>
             <a:ext cx="986892" cy="1403815"/>
           </a:xfrm>
           <a:prstGeom prst="rect">
@@ -29640,7 +30872,7 @@
         </p:blipFill>
         <p:spPr>
           <a:xfrm>
-            <a:off x="4437206" y="1053270"/>
+            <a:off x="3943539" y="1053270"/>
             <a:ext cx="3018730" cy="1585888"/>
           </a:xfrm>
           <a:prstGeom prst="rect">
@@ -29667,7 +30899,7 @@
         </p:blipFill>
         <p:spPr>
           <a:xfrm>
-            <a:off x="10559107" y="894945"/>
+            <a:off x="10940405" y="822089"/>
             <a:ext cx="1026473" cy="1905177"/>
           </a:xfrm>
           <a:prstGeom prst="rect">
@@ -29909,8 +31141,8 @@
         </p:nvSpPr>
         <p:spPr>
           <a:xfrm>
-            <a:off x="7866261" y="1639073"/>
-            <a:ext cx="1052862" cy="548860"/>
+            <a:off x="7100708" y="1639073"/>
+            <a:ext cx="2616497" cy="548860"/>
           </a:xfrm>
           <a:prstGeom prst="rect">
             <a:avLst/>
@@ -29944,7 +31176,7 @@
               <a:buNone/>
             </a:pPr>
             <a:r>
-              <a:rPr lang="pl" sz="3800" b="0" i="0" u="none" strike="noStrike" cap="none" baseline="0">
+              <a:rPr lang="pl" sz="3800" b="0" i="0" u="none" strike="noStrike" cap="none" baseline="0" dirty="0">
                 <a:solidFill>
                   <a:schemeClr val="lt1"/>
                 </a:solidFill>
@@ -30045,13 +31277,16 @@
       <p:cxnSp>
         <p:nvCxnSpPr>
           <p:cNvPr id="276" name="Shape 276"/>
-          <p:cNvCxnSpPr/>
+          <p:cNvCxnSpPr>
+            <a:cxnSpLocks/>
+            <a:endCxn id="263" idx="2"/>
+          </p:cNvCxnSpPr>
           <p:nvPr/>
         </p:nvCxnSpPr>
         <p:spPr>
-          <a:xfrm rot="10800000">
-            <a:off x="10024759" y="2479513"/>
-            <a:ext cx="915646" cy="883981"/>
+          <a:xfrm flipH="1" flipV="1">
+            <a:off x="10281929" y="2468021"/>
+            <a:ext cx="658476" cy="895474"/>
           </a:xfrm>
           <a:prstGeom prst="straightConnector1">
             <a:avLst/>

</xml_diff>